<commit_message>
Added mockup for login for desktop page
</commit_message>
<xml_diff>
--- a/PrelimIdeas.pptx
+++ b/PrelimIdeas.pptx
@@ -12,24 +12,25 @@
     <p:sldId id="279" r:id="rId6"/>
     <p:sldId id="261" r:id="rId7"/>
     <p:sldId id="264" r:id="rId8"/>
-    <p:sldId id="263" r:id="rId9"/>
-    <p:sldId id="259" r:id="rId10"/>
-    <p:sldId id="257" r:id="rId11"/>
-    <p:sldId id="258" r:id="rId12"/>
-    <p:sldId id="280" r:id="rId13"/>
-    <p:sldId id="265" r:id="rId14"/>
-    <p:sldId id="266" r:id="rId15"/>
-    <p:sldId id="267" r:id="rId16"/>
-    <p:sldId id="268" r:id="rId17"/>
-    <p:sldId id="269" r:id="rId18"/>
-    <p:sldId id="270" r:id="rId19"/>
-    <p:sldId id="271" r:id="rId20"/>
-    <p:sldId id="272" r:id="rId21"/>
-    <p:sldId id="273" r:id="rId22"/>
-    <p:sldId id="274" r:id="rId23"/>
-    <p:sldId id="275" r:id="rId24"/>
-    <p:sldId id="276" r:id="rId25"/>
-    <p:sldId id="277" r:id="rId26"/>
+    <p:sldId id="281" r:id="rId9"/>
+    <p:sldId id="263" r:id="rId10"/>
+    <p:sldId id="259" r:id="rId11"/>
+    <p:sldId id="257" r:id="rId12"/>
+    <p:sldId id="258" r:id="rId13"/>
+    <p:sldId id="280" r:id="rId14"/>
+    <p:sldId id="265" r:id="rId15"/>
+    <p:sldId id="266" r:id="rId16"/>
+    <p:sldId id="267" r:id="rId17"/>
+    <p:sldId id="268" r:id="rId18"/>
+    <p:sldId id="269" r:id="rId19"/>
+    <p:sldId id="270" r:id="rId20"/>
+    <p:sldId id="271" r:id="rId21"/>
+    <p:sldId id="272" r:id="rId22"/>
+    <p:sldId id="273" r:id="rId23"/>
+    <p:sldId id="274" r:id="rId24"/>
+    <p:sldId id="275" r:id="rId25"/>
+    <p:sldId id="276" r:id="rId26"/>
+    <p:sldId id="277" r:id="rId27"/>
   </p:sldIdLst>
   <p:sldSz cx="9144000" cy="6858000" type="screen4x3"/>
   <p:notesSz cx="6858000" cy="9144000"/>
@@ -312,7 +313,7 @@
           <a:p>
             <a:fld id="{21D185D8-DE1E-43F9-A572-BA76593623D0}" type="datetimeFigureOut">
               <a:rPr lang="en-SG" smtClean="0"/>
-              <a:t>13/5/2016</a:t>
+              <a:t>16/5/2016</a:t>
             </a:fld>
             <a:endParaRPr lang="en-SG"/>
           </a:p>
@@ -482,7 +483,7 @@
           <a:p>
             <a:fld id="{21D185D8-DE1E-43F9-A572-BA76593623D0}" type="datetimeFigureOut">
               <a:rPr lang="en-SG" smtClean="0"/>
-              <a:t>13/5/2016</a:t>
+              <a:t>16/5/2016</a:t>
             </a:fld>
             <a:endParaRPr lang="en-SG"/>
           </a:p>
@@ -662,7 +663,7 @@
           <a:p>
             <a:fld id="{21D185D8-DE1E-43F9-A572-BA76593623D0}" type="datetimeFigureOut">
               <a:rPr lang="en-SG" smtClean="0"/>
-              <a:t>13/5/2016</a:t>
+              <a:t>16/5/2016</a:t>
             </a:fld>
             <a:endParaRPr lang="en-SG"/>
           </a:p>
@@ -832,7 +833,7 @@
           <a:p>
             <a:fld id="{21D185D8-DE1E-43F9-A572-BA76593623D0}" type="datetimeFigureOut">
               <a:rPr lang="en-SG" smtClean="0"/>
-              <a:t>13/5/2016</a:t>
+              <a:t>16/5/2016</a:t>
             </a:fld>
             <a:endParaRPr lang="en-SG"/>
           </a:p>
@@ -1078,7 +1079,7 @@
           <a:p>
             <a:fld id="{21D185D8-DE1E-43F9-A572-BA76593623D0}" type="datetimeFigureOut">
               <a:rPr lang="en-SG" smtClean="0"/>
-              <a:t>13/5/2016</a:t>
+              <a:t>16/5/2016</a:t>
             </a:fld>
             <a:endParaRPr lang="en-SG"/>
           </a:p>
@@ -1366,7 +1367,7 @@
           <a:p>
             <a:fld id="{21D185D8-DE1E-43F9-A572-BA76593623D0}" type="datetimeFigureOut">
               <a:rPr lang="en-SG" smtClean="0"/>
-              <a:t>13/5/2016</a:t>
+              <a:t>16/5/2016</a:t>
             </a:fld>
             <a:endParaRPr lang="en-SG"/>
           </a:p>
@@ -1788,7 +1789,7 @@
           <a:p>
             <a:fld id="{21D185D8-DE1E-43F9-A572-BA76593623D0}" type="datetimeFigureOut">
               <a:rPr lang="en-SG" smtClean="0"/>
-              <a:t>13/5/2016</a:t>
+              <a:t>16/5/2016</a:t>
             </a:fld>
             <a:endParaRPr lang="en-SG"/>
           </a:p>
@@ -1906,7 +1907,7 @@
           <a:p>
             <a:fld id="{21D185D8-DE1E-43F9-A572-BA76593623D0}" type="datetimeFigureOut">
               <a:rPr lang="en-SG" smtClean="0"/>
-              <a:t>13/5/2016</a:t>
+              <a:t>16/5/2016</a:t>
             </a:fld>
             <a:endParaRPr lang="en-SG"/>
           </a:p>
@@ -2001,7 +2002,7 @@
           <a:p>
             <a:fld id="{21D185D8-DE1E-43F9-A572-BA76593623D0}" type="datetimeFigureOut">
               <a:rPr lang="en-SG" smtClean="0"/>
-              <a:t>13/5/2016</a:t>
+              <a:t>16/5/2016</a:t>
             </a:fld>
             <a:endParaRPr lang="en-SG"/>
           </a:p>
@@ -2278,7 +2279,7 @@
           <a:p>
             <a:fld id="{21D185D8-DE1E-43F9-A572-BA76593623D0}" type="datetimeFigureOut">
               <a:rPr lang="en-SG" smtClean="0"/>
-              <a:t>13/5/2016</a:t>
+              <a:t>16/5/2016</a:t>
             </a:fld>
             <a:endParaRPr lang="en-SG"/>
           </a:p>
@@ -2531,7 +2532,7 @@
           <a:p>
             <a:fld id="{21D185D8-DE1E-43F9-A572-BA76593623D0}" type="datetimeFigureOut">
               <a:rPr lang="en-SG" smtClean="0"/>
-              <a:t>13/5/2016</a:t>
+              <a:t>16/5/2016</a:t>
             </a:fld>
             <a:endParaRPr lang="en-SG"/>
           </a:p>
@@ -2744,7 +2745,7 @@
           <a:p>
             <a:fld id="{21D185D8-DE1E-43F9-A572-BA76593623D0}" type="datetimeFigureOut">
               <a:rPr lang="en-SG" smtClean="0"/>
-              <a:t>13/5/2016</a:t>
+              <a:t>16/5/2016</a:t>
             </a:fld>
             <a:endParaRPr lang="en-SG"/>
           </a:p>
@@ -3299,6 +3300,318 @@
           <a:chExt cx="0" cy="0"/>
         </a:xfrm>
       </p:grpSpPr>
+      <p:grpSp>
+        <p:nvGrpSpPr>
+          <p:cNvPr id="3" name="Group 2"/>
+          <p:cNvGrpSpPr/>
+          <p:nvPr/>
+        </p:nvGrpSpPr>
+        <p:grpSpPr>
+          <a:xfrm>
+            <a:off x="0" y="-6393"/>
+            <a:ext cx="7020272" cy="6876256"/>
+            <a:chOff x="0" y="-6393"/>
+            <a:chExt cx="7020272" cy="6876256"/>
+          </a:xfrm>
+        </p:grpSpPr>
+        <p:pic>
+          <p:nvPicPr>
+            <p:cNvPr id="3074" name="Picture 2" descr="https://image.freepik.com/free-vector/blue-technology-background_1035-1691.jpg"/>
+            <p:cNvPicPr>
+              <a:picLocks noChangeAspect="1" noChangeArrowheads="1"/>
+            </p:cNvPicPr>
+            <p:nvPr/>
+          </p:nvPicPr>
+          <p:blipFill>
+            <a:blip r:embed="rId2">
+              <a:extLst>
+                <a:ext uri="{28A0092B-C50C-407E-A947-70E740481C1C}">
+                  <a14:useLocalDpi xmlns:a14="http://schemas.microsoft.com/office/drawing/2010/main" val="0"/>
+                </a:ext>
+              </a:extLst>
+            </a:blip>
+            <a:srcRect/>
+            <a:stretch>
+              <a:fillRect/>
+            </a:stretch>
+          </p:blipFill>
+          <p:spPr bwMode="auto">
+            <a:xfrm>
+              <a:off x="0" y="-6393"/>
+              <a:ext cx="6876256" cy="6876256"/>
+            </a:xfrm>
+            <a:prstGeom prst="rect">
+              <a:avLst/>
+            </a:prstGeom>
+            <a:noFill/>
+            <a:extLst>
+              <a:ext uri="{909E8E84-426E-40DD-AFC4-6F175D3DCCD1}">
+                <a14:hiddenFill xmlns:a14="http://schemas.microsoft.com/office/drawing/2010/main">
+                  <a:solidFill>
+                    <a:srgbClr val="FFFFFF"/>
+                  </a:solidFill>
+                </a14:hiddenFill>
+              </a:ext>
+            </a:extLst>
+          </p:spPr>
+        </p:pic>
+        <p:sp>
+          <p:nvSpPr>
+            <p:cNvPr id="2" name="Rectangle 1"/>
+            <p:cNvSpPr/>
+            <p:nvPr/>
+          </p:nvSpPr>
+          <p:spPr>
+            <a:xfrm>
+              <a:off x="4139952" y="3933056"/>
+              <a:ext cx="2880320" cy="648072"/>
+            </a:xfrm>
+            <a:prstGeom prst="rect">
+              <a:avLst/>
+            </a:prstGeom>
+            <a:solidFill>
+              <a:schemeClr val="bg1"/>
+            </a:solidFill>
+            <a:ln>
+              <a:solidFill>
+                <a:schemeClr val="bg1"/>
+              </a:solidFill>
+            </a:ln>
+          </p:spPr>
+          <p:style>
+            <a:lnRef idx="2">
+              <a:schemeClr val="accent1">
+                <a:shade val="50000"/>
+              </a:schemeClr>
+            </a:lnRef>
+            <a:fillRef idx="1">
+              <a:schemeClr val="accent1"/>
+            </a:fillRef>
+            <a:effectRef idx="0">
+              <a:schemeClr val="accent1"/>
+            </a:effectRef>
+            <a:fontRef idx="minor">
+              <a:schemeClr val="lt1"/>
+            </a:fontRef>
+          </p:style>
+          <p:txBody>
+            <a:bodyPr rtlCol="0" anchor="ctr"/>
+            <a:lstStyle/>
+            <a:p>
+              <a:pPr algn="ctr"/>
+              <a:endParaRPr lang="en-SG"/>
+            </a:p>
+          </p:txBody>
+        </p:sp>
+      </p:grpSp>
+      <p:sp>
+        <p:nvSpPr>
+          <p:cNvPr id="4" name="AutoShape 6" descr="Vermin Vibes 2 Black sample text"/>
+          <p:cNvSpPr>
+            <a:spLocks noChangeAspect="1" noChangeArrowheads="1"/>
+          </p:cNvSpPr>
+          <p:nvPr/>
+        </p:nvSpPr>
+        <p:spPr bwMode="auto">
+          <a:xfrm>
+            <a:off x="155575" y="-144463"/>
+            <a:ext cx="304800" cy="304801"/>
+          </a:xfrm>
+          <a:prstGeom prst="rect">
+            <a:avLst/>
+          </a:prstGeom>
+          <a:noFill/>
+          <a:extLst>
+            <a:ext uri="{909E8E84-426E-40DD-AFC4-6F175D3DCCD1}">
+              <a14:hiddenFill xmlns:a14="http://schemas.microsoft.com/office/drawing/2010/main">
+                <a:solidFill>
+                  <a:srgbClr val="FFFFFF"/>
+                </a:solidFill>
+              </a14:hiddenFill>
+            </a:ext>
+          </a:extLst>
+        </p:spPr>
+        <p:txBody>
+          <a:bodyPr vert="horz" wrap="square" lIns="91440" tIns="45720" rIns="91440" bIns="45720" numCol="1" anchor="t" anchorCtr="0" compatLnSpc="1">
+            <a:prstTxWarp prst="textNoShape">
+              <a:avLst/>
+            </a:prstTxWarp>
+          </a:bodyPr>
+          <a:lstStyle/>
+          <a:p>
+            <a:endParaRPr lang="en-SG"/>
+          </a:p>
+        </p:txBody>
+      </p:sp>
+      <p:sp>
+        <p:nvSpPr>
+          <p:cNvPr id="5" name="AutoShape 8" descr="Vermin Vibes 2 Black sample text"/>
+          <p:cNvSpPr>
+            <a:spLocks noChangeAspect="1" noChangeArrowheads="1"/>
+          </p:cNvSpPr>
+          <p:nvPr/>
+        </p:nvSpPr>
+        <p:spPr bwMode="auto">
+          <a:xfrm>
+            <a:off x="307975" y="7937"/>
+            <a:ext cx="304800" cy="304801"/>
+          </a:xfrm>
+          <a:prstGeom prst="rect">
+            <a:avLst/>
+          </a:prstGeom>
+          <a:noFill/>
+          <a:extLst>
+            <a:ext uri="{909E8E84-426E-40DD-AFC4-6F175D3DCCD1}">
+              <a14:hiddenFill xmlns:a14="http://schemas.microsoft.com/office/drawing/2010/main">
+                <a:solidFill>
+                  <a:srgbClr val="FFFFFF"/>
+                </a:solidFill>
+              </a14:hiddenFill>
+            </a:ext>
+          </a:extLst>
+        </p:spPr>
+        <p:txBody>
+          <a:bodyPr vert="horz" wrap="square" lIns="91440" tIns="45720" rIns="91440" bIns="45720" numCol="1" anchor="t" anchorCtr="0" compatLnSpc="1">
+            <a:prstTxWarp prst="textNoShape">
+              <a:avLst/>
+            </a:prstTxWarp>
+          </a:bodyPr>
+          <a:lstStyle/>
+          <a:p>
+            <a:endParaRPr lang="en-SG"/>
+          </a:p>
+        </p:txBody>
+      </p:sp>
+      <p:sp>
+        <p:nvSpPr>
+          <p:cNvPr id="6" name="AutoShape 10" descr="Vermin Vibes 2 Black sample text"/>
+          <p:cNvSpPr>
+            <a:spLocks noChangeAspect="1" noChangeArrowheads="1"/>
+          </p:cNvSpPr>
+          <p:nvPr/>
+        </p:nvSpPr>
+        <p:spPr bwMode="auto">
+          <a:xfrm>
+            <a:off x="460375" y="160337"/>
+            <a:ext cx="304800" cy="304801"/>
+          </a:xfrm>
+          <a:prstGeom prst="rect">
+            <a:avLst/>
+          </a:prstGeom>
+          <a:noFill/>
+          <a:extLst>
+            <a:ext uri="{909E8E84-426E-40DD-AFC4-6F175D3DCCD1}">
+              <a14:hiddenFill xmlns:a14="http://schemas.microsoft.com/office/drawing/2010/main">
+                <a:solidFill>
+                  <a:srgbClr val="FFFFFF"/>
+                </a:solidFill>
+              </a14:hiddenFill>
+            </a:ext>
+          </a:extLst>
+        </p:spPr>
+        <p:txBody>
+          <a:bodyPr vert="horz" wrap="square" lIns="91440" tIns="45720" rIns="91440" bIns="45720" numCol="1" anchor="t" anchorCtr="0" compatLnSpc="1">
+            <a:prstTxWarp prst="textNoShape">
+              <a:avLst/>
+            </a:prstTxWarp>
+          </a:bodyPr>
+          <a:lstStyle/>
+          <a:p>
+            <a:endParaRPr lang="en-SG"/>
+          </a:p>
+        </p:txBody>
+      </p:sp>
+      <p:pic>
+        <p:nvPicPr>
+          <p:cNvPr id="3083" name="Picture 11"/>
+          <p:cNvPicPr>
+            <a:picLocks noChangeAspect="1" noChangeArrowheads="1"/>
+          </p:cNvPicPr>
+          <p:nvPr/>
+        </p:nvPicPr>
+        <p:blipFill>
+          <a:blip r:embed="rId3">
+            <a:extLst>
+              <a:ext uri="{28A0092B-C50C-407E-A947-70E740481C1C}">
+                <a14:useLocalDpi xmlns:a14="http://schemas.microsoft.com/office/drawing/2010/main" val="0"/>
+              </a:ext>
+            </a:extLst>
+          </a:blip>
+          <a:srcRect/>
+          <a:stretch>
+            <a:fillRect/>
+          </a:stretch>
+        </p:blipFill>
+        <p:spPr bwMode="auto">
+          <a:xfrm>
+            <a:off x="4499992" y="3789040"/>
+            <a:ext cx="4171950" cy="628650"/>
+          </a:xfrm>
+          <a:prstGeom prst="rect">
+            <a:avLst/>
+          </a:prstGeom>
+          <a:noFill/>
+          <a:ln>
+            <a:noFill/>
+          </a:ln>
+          <a:extLst>
+            <a:ext uri="{909E8E84-426E-40DD-AFC4-6F175D3DCCD1}">
+              <a14:hiddenFill xmlns:a14="http://schemas.microsoft.com/office/drawing/2010/main">
+                <a:solidFill>
+                  <a:schemeClr val="accent1"/>
+                </a:solidFill>
+              </a14:hiddenFill>
+            </a:ext>
+            <a:ext uri="{91240B29-F687-4F45-9708-019B960494DF}">
+              <a14:hiddenLine xmlns:a14="http://schemas.microsoft.com/office/drawing/2010/main" w="9525">
+                <a:solidFill>
+                  <a:schemeClr val="tx1"/>
+                </a:solidFill>
+                <a:miter lim="800000"/>
+                <a:headEnd/>
+                <a:tailEnd/>
+              </a14:hiddenLine>
+            </a:ext>
+          </a:extLst>
+        </p:spPr>
+      </p:pic>
+    </p:spTree>
+    <p:extLst>
+      <p:ext uri="{BB962C8B-B14F-4D97-AF65-F5344CB8AC3E}">
+        <p14:creationId xmlns:p14="http://schemas.microsoft.com/office/powerpoint/2010/main" val="1350431017"/>
+      </p:ext>
+    </p:extLst>
+  </p:cSld>
+  <p:clrMapOvr>
+    <a:masterClrMapping/>
+  </p:clrMapOvr>
+  <p:timing>
+    <p:tnLst>
+      <p:par>
+        <p:cTn id="1" dur="indefinite" restart="never" nodeType="tmRoot"/>
+      </p:par>
+    </p:tnLst>
+  </p:timing>
+</p:sld>
+</file>
+
+<file path=ppt/slides/slide11.xml><?xml version="1.0" encoding="utf-8"?>
+<p:sld xmlns:a="http://schemas.openxmlformats.org/drawingml/2006/main" xmlns:r="http://schemas.openxmlformats.org/officeDocument/2006/relationships" xmlns:p="http://schemas.openxmlformats.org/presentationml/2006/main">
+  <p:cSld>
+    <p:spTree>
+      <p:nvGrpSpPr>
+        <p:cNvPr id="1" name=""/>
+        <p:cNvGrpSpPr/>
+        <p:nvPr/>
+      </p:nvGrpSpPr>
+      <p:grpSpPr>
+        <a:xfrm>
+          <a:off x="0" y="0"/>
+          <a:ext cx="0" cy="0"/>
+          <a:chOff x="0" y="0"/>
+          <a:chExt cx="0" cy="0"/>
+        </a:xfrm>
+      </p:grpSpPr>
       <p:pic>
         <p:nvPicPr>
           <p:cNvPr id="2050" name="Picture 2"/>
@@ -3383,7 +3696,7 @@
 </p:sld>
 </file>
 
-<file path=ppt/slides/slide11.xml><?xml version="1.0" encoding="utf-8"?>
+<file path=ppt/slides/slide12.xml><?xml version="1.0" encoding="utf-8"?>
 <p:sld xmlns:a="http://schemas.openxmlformats.org/drawingml/2006/main" xmlns:r="http://schemas.openxmlformats.org/officeDocument/2006/relationships" xmlns:p="http://schemas.openxmlformats.org/presentationml/2006/main">
   <p:cSld>
     <p:spTree>
@@ -3484,7 +3797,7 @@
 </p:sld>
 </file>
 
-<file path=ppt/slides/slide12.xml><?xml version="1.0" encoding="utf-8"?>
+<file path=ppt/slides/slide13.xml><?xml version="1.0" encoding="utf-8"?>
 <p:sld xmlns:a="http://schemas.openxmlformats.org/drawingml/2006/main" xmlns:r="http://schemas.openxmlformats.org/officeDocument/2006/relationships" xmlns:p="http://schemas.openxmlformats.org/presentationml/2006/main">
   <p:cSld>
     <p:spTree>
@@ -3568,7 +3881,7 @@
 </p:sld>
 </file>
 
-<file path=ppt/slides/slide13.xml><?xml version="1.0" encoding="utf-8"?>
+<file path=ppt/slides/slide14.xml><?xml version="1.0" encoding="utf-8"?>
 <p:sld xmlns:a="http://schemas.openxmlformats.org/drawingml/2006/main" xmlns:r="http://schemas.openxmlformats.org/officeDocument/2006/relationships" xmlns:p="http://schemas.openxmlformats.org/presentationml/2006/main">
   <p:cSld>
     <p:spTree>
@@ -4276,269 +4589,13 @@
   <p:clrMapOvr>
     <a:masterClrMapping/>
   </p:clrMapOvr>
-</p:sld>
-</file>
-
-<file path=ppt/slides/slide14.xml><?xml version="1.0" encoding="utf-8"?>
-<p:sld xmlns:a="http://schemas.openxmlformats.org/drawingml/2006/main" xmlns:r="http://schemas.openxmlformats.org/officeDocument/2006/relationships" xmlns:p="http://schemas.openxmlformats.org/presentationml/2006/main">
-  <p:cSld>
-    <p:spTree>
-      <p:nvGrpSpPr>
-        <p:cNvPr id="1" name=""/>
-        <p:cNvGrpSpPr/>
-        <p:nvPr/>
-      </p:nvGrpSpPr>
-      <p:grpSpPr>
-        <a:xfrm>
-          <a:off x="0" y="0"/>
-          <a:ext cx="0" cy="0"/>
-          <a:chOff x="0" y="0"/>
-          <a:chExt cx="0" cy="0"/>
-        </a:xfrm>
-      </p:grpSpPr>
-      <p:pic>
-        <p:nvPicPr>
-          <p:cNvPr id="3" name="Picture 7" descr="http://thefrugalcomputerguy.com/images/ipeGreen.png"/>
-          <p:cNvPicPr>
-            <a:picLocks noChangeAspect="1" noChangeArrowheads="1"/>
-          </p:cNvPicPr>
-          <p:nvPr/>
-        </p:nvPicPr>
-        <p:blipFill>
-          <a:blip r:embed="rId2">
-            <a:extLst>
-              <a:ext uri="{28A0092B-C50C-407E-A947-70E740481C1C}">
-                <a14:useLocalDpi xmlns:a14="http://schemas.microsoft.com/office/drawing/2010/main" val="0"/>
-              </a:ext>
-            </a:extLst>
-          </a:blip>
-          <a:srcRect/>
-          <a:stretch>
-            <a:fillRect/>
-          </a:stretch>
-        </p:blipFill>
-        <p:spPr bwMode="auto">
-          <a:xfrm>
-            <a:off x="-33537" y="1960"/>
-            <a:ext cx="9203463" cy="6856040"/>
-          </a:xfrm>
-          <a:prstGeom prst="rect">
-            <a:avLst/>
-          </a:prstGeom>
-          <a:noFill/>
-          <a:extLst>
-            <a:ext uri="{909E8E84-426E-40DD-AFC4-6F175D3DCCD1}">
-              <a14:hiddenFill xmlns:a14="http://schemas.microsoft.com/office/drawing/2010/main">
-                <a:solidFill>
-                  <a:srgbClr val="FFFFFF"/>
-                </a:solidFill>
-              </a14:hiddenFill>
-            </a:ext>
-          </a:extLst>
-        </p:spPr>
-      </p:pic>
-      <p:pic>
-        <p:nvPicPr>
-          <p:cNvPr id="11266" name="Picture 2"/>
-          <p:cNvPicPr>
-            <a:picLocks noChangeAspect="1" noChangeArrowheads="1"/>
-          </p:cNvPicPr>
-          <p:nvPr/>
-        </p:nvPicPr>
-        <p:blipFill>
-          <a:blip r:embed="rId3">
-            <a:extLst>
-              <a:ext uri="{28A0092B-C50C-407E-A947-70E740481C1C}">
-                <a14:useLocalDpi xmlns:a14="http://schemas.microsoft.com/office/drawing/2010/main" val="0"/>
-              </a:ext>
-            </a:extLst>
-          </a:blip>
-          <a:srcRect/>
-          <a:stretch>
-            <a:fillRect/>
-          </a:stretch>
-        </p:blipFill>
-        <p:spPr bwMode="auto">
-          <a:xfrm>
-            <a:off x="-180528" y="-10019"/>
-            <a:ext cx="4448175" cy="3409950"/>
-          </a:xfrm>
-          <a:prstGeom prst="rect">
-            <a:avLst/>
-          </a:prstGeom>
-          <a:noFill/>
-          <a:ln>
-            <a:noFill/>
-          </a:ln>
-          <a:effectLst/>
-          <a:extLst>
-            <a:ext uri="{909E8E84-426E-40DD-AFC4-6F175D3DCCD1}">
-              <a14:hiddenFill xmlns:a14="http://schemas.microsoft.com/office/drawing/2010/main">
-                <a:solidFill>
-                  <a:schemeClr val="accent1"/>
-                </a:solidFill>
-              </a14:hiddenFill>
-            </a:ext>
-            <a:ext uri="{91240B29-F687-4F45-9708-019B960494DF}">
-              <a14:hiddenLine xmlns:a14="http://schemas.microsoft.com/office/drawing/2010/main" w="9525">
-                <a:solidFill>
-                  <a:schemeClr val="tx1"/>
-                </a:solidFill>
-                <a:miter lim="800000"/>
-                <a:headEnd/>
-                <a:tailEnd/>
-              </a14:hiddenLine>
-            </a:ext>
-            <a:ext uri="{AF507438-7753-43E0-B8FC-AC1667EBCBE1}">
-              <a14:hiddenEffects xmlns:a14="http://schemas.microsoft.com/office/drawing/2010/main">
-                <a:effectLst>
-                  <a:outerShdw dist="35921" dir="2700000" algn="ctr" rotWithShape="0">
-                    <a:schemeClr val="bg2"/>
-                  </a:outerShdw>
-                </a:effectLst>
-              </a14:hiddenEffects>
-            </a:ext>
-          </a:extLst>
-        </p:spPr>
-      </p:pic>
-      <p:pic>
-        <p:nvPicPr>
-          <p:cNvPr id="11268" name="Picture 4"/>
-          <p:cNvPicPr>
-            <a:picLocks noChangeAspect="1" noChangeArrowheads="1"/>
-          </p:cNvPicPr>
-          <p:nvPr/>
-        </p:nvPicPr>
-        <p:blipFill>
-          <a:blip r:embed="rId4">
-            <a:extLst>
-              <a:ext uri="{28A0092B-C50C-407E-A947-70E740481C1C}">
-                <a14:useLocalDpi xmlns:a14="http://schemas.microsoft.com/office/drawing/2010/main" val="0"/>
-              </a:ext>
-            </a:extLst>
-          </a:blip>
-          <a:srcRect/>
-          <a:stretch>
-            <a:fillRect/>
-          </a:stretch>
-        </p:blipFill>
-        <p:spPr bwMode="auto">
-          <a:xfrm>
-            <a:off x="-61246" y="3645024"/>
-            <a:ext cx="2838450" cy="3009900"/>
-          </a:xfrm>
-          <a:prstGeom prst="rect">
-            <a:avLst/>
-          </a:prstGeom>
-          <a:noFill/>
-          <a:ln>
-            <a:noFill/>
-          </a:ln>
-          <a:effectLst/>
-          <a:extLst>
-            <a:ext uri="{909E8E84-426E-40DD-AFC4-6F175D3DCCD1}">
-              <a14:hiddenFill xmlns:a14="http://schemas.microsoft.com/office/drawing/2010/main">
-                <a:solidFill>
-                  <a:schemeClr val="accent1"/>
-                </a:solidFill>
-              </a14:hiddenFill>
-            </a:ext>
-            <a:ext uri="{91240B29-F687-4F45-9708-019B960494DF}">
-              <a14:hiddenLine xmlns:a14="http://schemas.microsoft.com/office/drawing/2010/main" w="9525">
-                <a:solidFill>
-                  <a:schemeClr val="tx1"/>
-                </a:solidFill>
-                <a:miter lim="800000"/>
-                <a:headEnd/>
-                <a:tailEnd/>
-              </a14:hiddenLine>
-            </a:ext>
-            <a:ext uri="{AF507438-7753-43E0-B8FC-AC1667EBCBE1}">
-              <a14:hiddenEffects xmlns:a14="http://schemas.microsoft.com/office/drawing/2010/main">
-                <a:effectLst>
-                  <a:outerShdw dist="35921" dir="2700000" algn="ctr" rotWithShape="0">
-                    <a:schemeClr val="bg2"/>
-                  </a:outerShdw>
-                </a:effectLst>
-              </a14:hiddenEffects>
-            </a:ext>
-          </a:extLst>
-        </p:spPr>
-      </p:pic>
-      <p:pic>
-        <p:nvPicPr>
-          <p:cNvPr id="11269" name="Picture 5"/>
-          <p:cNvPicPr>
-            <a:picLocks noChangeAspect="1" noChangeArrowheads="1"/>
-          </p:cNvPicPr>
-          <p:nvPr/>
-        </p:nvPicPr>
-        <p:blipFill>
-          <a:blip r:embed="rId5">
-            <a:extLst>
-              <a:ext uri="{28A0092B-C50C-407E-A947-70E740481C1C}">
-                <a14:useLocalDpi xmlns:a14="http://schemas.microsoft.com/office/drawing/2010/main" val="0"/>
-              </a:ext>
-            </a:extLst>
-          </a:blip>
-          <a:srcRect/>
-          <a:stretch>
-            <a:fillRect/>
-          </a:stretch>
-        </p:blipFill>
-        <p:spPr bwMode="auto">
-          <a:xfrm>
-            <a:off x="2043559" y="2502024"/>
-            <a:ext cx="3505200" cy="4152900"/>
-          </a:xfrm>
-          <a:prstGeom prst="rect">
-            <a:avLst/>
-          </a:prstGeom>
-          <a:noFill/>
-          <a:ln>
-            <a:noFill/>
-          </a:ln>
-          <a:effectLst/>
-          <a:extLst>
-            <a:ext uri="{909E8E84-426E-40DD-AFC4-6F175D3DCCD1}">
-              <a14:hiddenFill xmlns:a14="http://schemas.microsoft.com/office/drawing/2010/main">
-                <a:solidFill>
-                  <a:schemeClr val="accent1"/>
-                </a:solidFill>
-              </a14:hiddenFill>
-            </a:ext>
-            <a:ext uri="{91240B29-F687-4F45-9708-019B960494DF}">
-              <a14:hiddenLine xmlns:a14="http://schemas.microsoft.com/office/drawing/2010/main" w="9525">
-                <a:solidFill>
-                  <a:schemeClr val="tx1"/>
-                </a:solidFill>
-                <a:miter lim="800000"/>
-                <a:headEnd/>
-                <a:tailEnd/>
-              </a14:hiddenLine>
-            </a:ext>
-            <a:ext uri="{AF507438-7753-43E0-B8FC-AC1667EBCBE1}">
-              <a14:hiddenEffects xmlns:a14="http://schemas.microsoft.com/office/drawing/2010/main">
-                <a:effectLst>
-                  <a:outerShdw dist="35921" dir="2700000" algn="ctr" rotWithShape="0">
-                    <a:schemeClr val="bg2"/>
-                  </a:outerShdw>
-                </a:effectLst>
-              </a14:hiddenEffects>
-            </a:ext>
-          </a:extLst>
-        </p:spPr>
-      </p:pic>
-    </p:spTree>
-    <p:extLst>
-      <p:ext uri="{BB962C8B-B14F-4D97-AF65-F5344CB8AC3E}">
-        <p14:creationId xmlns:p14="http://schemas.microsoft.com/office/powerpoint/2010/main" val="2212618319"/>
-      </p:ext>
-    </p:extLst>
-  </p:cSld>
-  <p:clrMapOvr>
-    <a:masterClrMapping/>
-  </p:clrMapOvr>
+  <p:timing>
+    <p:tnLst>
+      <p:par>
+        <p:cTn id="1" dur="indefinite" restart="never" nodeType="tmRoot"/>
+      </p:par>
+    </p:tnLst>
+  </p:timing>
 </p:sld>
 </file>
 
@@ -4602,6 +4659,276 @@
       </p:pic>
       <p:pic>
         <p:nvPicPr>
+          <p:cNvPr id="11266" name="Picture 2"/>
+          <p:cNvPicPr>
+            <a:picLocks noChangeAspect="1" noChangeArrowheads="1"/>
+          </p:cNvPicPr>
+          <p:nvPr/>
+        </p:nvPicPr>
+        <p:blipFill>
+          <a:blip r:embed="rId3">
+            <a:extLst>
+              <a:ext uri="{28A0092B-C50C-407E-A947-70E740481C1C}">
+                <a14:useLocalDpi xmlns:a14="http://schemas.microsoft.com/office/drawing/2010/main" val="0"/>
+              </a:ext>
+            </a:extLst>
+          </a:blip>
+          <a:srcRect/>
+          <a:stretch>
+            <a:fillRect/>
+          </a:stretch>
+        </p:blipFill>
+        <p:spPr bwMode="auto">
+          <a:xfrm>
+            <a:off x="-180528" y="-10019"/>
+            <a:ext cx="4448175" cy="3409950"/>
+          </a:xfrm>
+          <a:prstGeom prst="rect">
+            <a:avLst/>
+          </a:prstGeom>
+          <a:noFill/>
+          <a:ln>
+            <a:noFill/>
+          </a:ln>
+          <a:effectLst/>
+          <a:extLst>
+            <a:ext uri="{909E8E84-426E-40DD-AFC4-6F175D3DCCD1}">
+              <a14:hiddenFill xmlns:a14="http://schemas.microsoft.com/office/drawing/2010/main">
+                <a:solidFill>
+                  <a:schemeClr val="accent1"/>
+                </a:solidFill>
+              </a14:hiddenFill>
+            </a:ext>
+            <a:ext uri="{91240B29-F687-4F45-9708-019B960494DF}">
+              <a14:hiddenLine xmlns:a14="http://schemas.microsoft.com/office/drawing/2010/main" w="9525">
+                <a:solidFill>
+                  <a:schemeClr val="tx1"/>
+                </a:solidFill>
+                <a:miter lim="800000"/>
+                <a:headEnd/>
+                <a:tailEnd/>
+              </a14:hiddenLine>
+            </a:ext>
+            <a:ext uri="{AF507438-7753-43E0-B8FC-AC1667EBCBE1}">
+              <a14:hiddenEffects xmlns:a14="http://schemas.microsoft.com/office/drawing/2010/main">
+                <a:effectLst>
+                  <a:outerShdw dist="35921" dir="2700000" algn="ctr" rotWithShape="0">
+                    <a:schemeClr val="bg2"/>
+                  </a:outerShdw>
+                </a:effectLst>
+              </a14:hiddenEffects>
+            </a:ext>
+          </a:extLst>
+        </p:spPr>
+      </p:pic>
+      <p:pic>
+        <p:nvPicPr>
+          <p:cNvPr id="11268" name="Picture 4"/>
+          <p:cNvPicPr>
+            <a:picLocks noChangeAspect="1" noChangeArrowheads="1"/>
+          </p:cNvPicPr>
+          <p:nvPr/>
+        </p:nvPicPr>
+        <p:blipFill>
+          <a:blip r:embed="rId4">
+            <a:extLst>
+              <a:ext uri="{28A0092B-C50C-407E-A947-70E740481C1C}">
+                <a14:useLocalDpi xmlns:a14="http://schemas.microsoft.com/office/drawing/2010/main" val="0"/>
+              </a:ext>
+            </a:extLst>
+          </a:blip>
+          <a:srcRect/>
+          <a:stretch>
+            <a:fillRect/>
+          </a:stretch>
+        </p:blipFill>
+        <p:spPr bwMode="auto">
+          <a:xfrm>
+            <a:off x="-61246" y="3645024"/>
+            <a:ext cx="2838450" cy="3009900"/>
+          </a:xfrm>
+          <a:prstGeom prst="rect">
+            <a:avLst/>
+          </a:prstGeom>
+          <a:noFill/>
+          <a:ln>
+            <a:noFill/>
+          </a:ln>
+          <a:effectLst/>
+          <a:extLst>
+            <a:ext uri="{909E8E84-426E-40DD-AFC4-6F175D3DCCD1}">
+              <a14:hiddenFill xmlns:a14="http://schemas.microsoft.com/office/drawing/2010/main">
+                <a:solidFill>
+                  <a:schemeClr val="accent1"/>
+                </a:solidFill>
+              </a14:hiddenFill>
+            </a:ext>
+            <a:ext uri="{91240B29-F687-4F45-9708-019B960494DF}">
+              <a14:hiddenLine xmlns:a14="http://schemas.microsoft.com/office/drawing/2010/main" w="9525">
+                <a:solidFill>
+                  <a:schemeClr val="tx1"/>
+                </a:solidFill>
+                <a:miter lim="800000"/>
+                <a:headEnd/>
+                <a:tailEnd/>
+              </a14:hiddenLine>
+            </a:ext>
+            <a:ext uri="{AF507438-7753-43E0-B8FC-AC1667EBCBE1}">
+              <a14:hiddenEffects xmlns:a14="http://schemas.microsoft.com/office/drawing/2010/main">
+                <a:effectLst>
+                  <a:outerShdw dist="35921" dir="2700000" algn="ctr" rotWithShape="0">
+                    <a:schemeClr val="bg2"/>
+                  </a:outerShdw>
+                </a:effectLst>
+              </a14:hiddenEffects>
+            </a:ext>
+          </a:extLst>
+        </p:spPr>
+      </p:pic>
+      <p:pic>
+        <p:nvPicPr>
+          <p:cNvPr id="11269" name="Picture 5"/>
+          <p:cNvPicPr>
+            <a:picLocks noChangeAspect="1" noChangeArrowheads="1"/>
+          </p:cNvPicPr>
+          <p:nvPr/>
+        </p:nvPicPr>
+        <p:blipFill>
+          <a:blip r:embed="rId5">
+            <a:extLst>
+              <a:ext uri="{28A0092B-C50C-407E-A947-70E740481C1C}">
+                <a14:useLocalDpi xmlns:a14="http://schemas.microsoft.com/office/drawing/2010/main" val="0"/>
+              </a:ext>
+            </a:extLst>
+          </a:blip>
+          <a:srcRect/>
+          <a:stretch>
+            <a:fillRect/>
+          </a:stretch>
+        </p:blipFill>
+        <p:spPr bwMode="auto">
+          <a:xfrm>
+            <a:off x="2043559" y="2502024"/>
+            <a:ext cx="3505200" cy="4152900"/>
+          </a:xfrm>
+          <a:prstGeom prst="rect">
+            <a:avLst/>
+          </a:prstGeom>
+          <a:noFill/>
+          <a:ln>
+            <a:noFill/>
+          </a:ln>
+          <a:effectLst/>
+          <a:extLst>
+            <a:ext uri="{909E8E84-426E-40DD-AFC4-6F175D3DCCD1}">
+              <a14:hiddenFill xmlns:a14="http://schemas.microsoft.com/office/drawing/2010/main">
+                <a:solidFill>
+                  <a:schemeClr val="accent1"/>
+                </a:solidFill>
+              </a14:hiddenFill>
+            </a:ext>
+            <a:ext uri="{91240B29-F687-4F45-9708-019B960494DF}">
+              <a14:hiddenLine xmlns:a14="http://schemas.microsoft.com/office/drawing/2010/main" w="9525">
+                <a:solidFill>
+                  <a:schemeClr val="tx1"/>
+                </a:solidFill>
+                <a:miter lim="800000"/>
+                <a:headEnd/>
+                <a:tailEnd/>
+              </a14:hiddenLine>
+            </a:ext>
+            <a:ext uri="{AF507438-7753-43E0-B8FC-AC1667EBCBE1}">
+              <a14:hiddenEffects xmlns:a14="http://schemas.microsoft.com/office/drawing/2010/main">
+                <a:effectLst>
+                  <a:outerShdw dist="35921" dir="2700000" algn="ctr" rotWithShape="0">
+                    <a:schemeClr val="bg2"/>
+                  </a:outerShdw>
+                </a:effectLst>
+              </a14:hiddenEffects>
+            </a:ext>
+          </a:extLst>
+        </p:spPr>
+      </p:pic>
+    </p:spTree>
+    <p:extLst>
+      <p:ext uri="{BB962C8B-B14F-4D97-AF65-F5344CB8AC3E}">
+        <p14:creationId xmlns:p14="http://schemas.microsoft.com/office/powerpoint/2010/main" val="2212618319"/>
+      </p:ext>
+    </p:extLst>
+  </p:cSld>
+  <p:clrMapOvr>
+    <a:masterClrMapping/>
+  </p:clrMapOvr>
+  <p:timing>
+    <p:tnLst>
+      <p:par>
+        <p:cTn id="1" dur="indefinite" restart="never" nodeType="tmRoot"/>
+      </p:par>
+    </p:tnLst>
+  </p:timing>
+</p:sld>
+</file>
+
+<file path=ppt/slides/slide16.xml><?xml version="1.0" encoding="utf-8"?>
+<p:sld xmlns:a="http://schemas.openxmlformats.org/drawingml/2006/main" xmlns:r="http://schemas.openxmlformats.org/officeDocument/2006/relationships" xmlns:p="http://schemas.openxmlformats.org/presentationml/2006/main">
+  <p:cSld>
+    <p:spTree>
+      <p:nvGrpSpPr>
+        <p:cNvPr id="1" name=""/>
+        <p:cNvGrpSpPr/>
+        <p:nvPr/>
+      </p:nvGrpSpPr>
+      <p:grpSpPr>
+        <a:xfrm>
+          <a:off x="0" y="0"/>
+          <a:ext cx="0" cy="0"/>
+          <a:chOff x="0" y="0"/>
+          <a:chExt cx="0" cy="0"/>
+        </a:xfrm>
+      </p:grpSpPr>
+      <p:pic>
+        <p:nvPicPr>
+          <p:cNvPr id="3" name="Picture 7" descr="http://thefrugalcomputerguy.com/images/ipeGreen.png"/>
+          <p:cNvPicPr>
+            <a:picLocks noChangeAspect="1" noChangeArrowheads="1"/>
+          </p:cNvPicPr>
+          <p:nvPr/>
+        </p:nvPicPr>
+        <p:blipFill>
+          <a:blip r:embed="rId2">
+            <a:extLst>
+              <a:ext uri="{28A0092B-C50C-407E-A947-70E740481C1C}">
+                <a14:useLocalDpi xmlns:a14="http://schemas.microsoft.com/office/drawing/2010/main" val="0"/>
+              </a:ext>
+            </a:extLst>
+          </a:blip>
+          <a:srcRect/>
+          <a:stretch>
+            <a:fillRect/>
+          </a:stretch>
+        </p:blipFill>
+        <p:spPr bwMode="auto">
+          <a:xfrm>
+            <a:off x="-33537" y="1960"/>
+            <a:ext cx="9203463" cy="6856040"/>
+          </a:xfrm>
+          <a:prstGeom prst="rect">
+            <a:avLst/>
+          </a:prstGeom>
+          <a:noFill/>
+          <a:extLst>
+            <a:ext uri="{909E8E84-426E-40DD-AFC4-6F175D3DCCD1}">
+              <a14:hiddenFill xmlns:a14="http://schemas.microsoft.com/office/drawing/2010/main">
+                <a:solidFill>
+                  <a:srgbClr val="FFFFFF"/>
+                </a:solidFill>
+              </a14:hiddenFill>
+            </a:ext>
+          </a:extLst>
+        </p:spPr>
+      </p:pic>
+      <p:pic>
+        <p:nvPicPr>
           <p:cNvPr id="12290" name="Picture 2"/>
           <p:cNvPicPr>
             <a:picLocks noChangeAspect="1" noChangeArrowheads="1"/>
@@ -4738,77 +5065,13 @@
   <p:clrMapOvr>
     <a:masterClrMapping/>
   </p:clrMapOvr>
-</p:sld>
-</file>
-
-<file path=ppt/slides/slide16.xml><?xml version="1.0" encoding="utf-8"?>
-<p:sld xmlns:a="http://schemas.openxmlformats.org/drawingml/2006/main" xmlns:r="http://schemas.openxmlformats.org/officeDocument/2006/relationships" xmlns:p="http://schemas.openxmlformats.org/presentationml/2006/main">
-  <p:cSld>
-    <p:spTree>
-      <p:nvGrpSpPr>
-        <p:cNvPr id="1" name=""/>
-        <p:cNvGrpSpPr/>
-        <p:nvPr/>
-      </p:nvGrpSpPr>
-      <p:grpSpPr>
-        <a:xfrm>
-          <a:off x="0" y="0"/>
-          <a:ext cx="0" cy="0"/>
-          <a:chOff x="0" y="0"/>
-          <a:chExt cx="0" cy="0"/>
-        </a:xfrm>
-      </p:grpSpPr>
-      <p:pic>
-        <p:nvPicPr>
-          <p:cNvPr id="2" name="Picture 7" descr="http://thefrugalcomputerguy.com/images/ipeGreen.png"/>
-          <p:cNvPicPr>
-            <a:picLocks noChangeAspect="1" noChangeArrowheads="1"/>
-          </p:cNvPicPr>
-          <p:nvPr/>
-        </p:nvPicPr>
-        <p:blipFill>
-          <a:blip r:embed="rId2">
-            <a:extLst>
-              <a:ext uri="{28A0092B-C50C-407E-A947-70E740481C1C}">
-                <a14:useLocalDpi xmlns:a14="http://schemas.microsoft.com/office/drawing/2010/main" val="0"/>
-              </a:ext>
-            </a:extLst>
-          </a:blip>
-          <a:srcRect/>
-          <a:stretch>
-            <a:fillRect/>
-          </a:stretch>
-        </p:blipFill>
-        <p:spPr bwMode="auto">
-          <a:xfrm>
-            <a:off x="-33537" y="1960"/>
-            <a:ext cx="9203463" cy="6856040"/>
-          </a:xfrm>
-          <a:prstGeom prst="rect">
-            <a:avLst/>
-          </a:prstGeom>
-          <a:noFill/>
-          <a:extLst>
-            <a:ext uri="{909E8E84-426E-40DD-AFC4-6F175D3DCCD1}">
-              <a14:hiddenFill xmlns:a14="http://schemas.microsoft.com/office/drawing/2010/main">
-                <a:solidFill>
-                  <a:srgbClr val="FFFFFF"/>
-                </a:solidFill>
-              </a14:hiddenFill>
-            </a:ext>
-          </a:extLst>
-        </p:spPr>
-      </p:pic>
-    </p:spTree>
-    <p:extLst>
-      <p:ext uri="{BB962C8B-B14F-4D97-AF65-F5344CB8AC3E}">
-        <p14:creationId xmlns:p14="http://schemas.microsoft.com/office/powerpoint/2010/main" val="427072275"/>
-      </p:ext>
-    </p:extLst>
-  </p:cSld>
-  <p:clrMapOvr>
-    <a:masterClrMapping/>
-  </p:clrMapOvr>
+  <p:timing>
+    <p:tnLst>
+      <p:par>
+        <p:cTn id="1" dur="indefinite" restart="never" nodeType="tmRoot"/>
+      </p:par>
+    </p:tnLst>
+  </p:timing>
 </p:sld>
 </file>
 
@@ -4870,16 +5133,246 @@
           </a:extLst>
         </p:spPr>
       </p:pic>
+      <p:pic>
+        <p:nvPicPr>
+          <p:cNvPr id="2050" name="Picture 2" descr="http://www.elephanthousemedia.com/images/chalkboard-background----background-labs-qis2map7.jpg"/>
+          <p:cNvPicPr>
+            <a:picLocks noChangeAspect="1" noChangeArrowheads="1"/>
+          </p:cNvPicPr>
+          <p:nvPr/>
+        </p:nvPicPr>
+        <p:blipFill>
+          <a:blip r:embed="rId3" cstate="print">
+            <a:extLst>
+              <a:ext uri="{28A0092B-C50C-407E-A947-70E740481C1C}">
+                <a14:useLocalDpi xmlns:a14="http://schemas.microsoft.com/office/drawing/2010/main" val="0"/>
+              </a:ext>
+            </a:extLst>
+          </a:blip>
+          <a:srcRect/>
+          <a:stretch>
+            <a:fillRect/>
+          </a:stretch>
+        </p:blipFill>
+        <p:spPr bwMode="auto">
+          <a:xfrm>
+            <a:off x="179512" y="188640"/>
+            <a:ext cx="3802023" cy="2376264"/>
+          </a:xfrm>
+          <a:prstGeom prst="rect">
+            <a:avLst/>
+          </a:prstGeom>
+          <a:noFill/>
+          <a:extLst>
+            <a:ext uri="{909E8E84-426E-40DD-AFC4-6F175D3DCCD1}">
+              <a14:hiddenFill xmlns:a14="http://schemas.microsoft.com/office/drawing/2010/main">
+                <a:solidFill>
+                  <a:srgbClr val="FFFFFF"/>
+                </a:solidFill>
+              </a14:hiddenFill>
+            </a:ext>
+          </a:extLst>
+        </p:spPr>
+      </p:pic>
+      <p:pic>
+        <p:nvPicPr>
+          <p:cNvPr id="2051" name="Picture 3"/>
+          <p:cNvPicPr>
+            <a:picLocks noChangeAspect="1" noChangeArrowheads="1"/>
+          </p:cNvPicPr>
+          <p:nvPr/>
+        </p:nvPicPr>
+        <p:blipFill>
+          <a:blip r:embed="rId4" cstate="print">
+            <a:extLst>
+              <a:ext uri="{28A0092B-C50C-407E-A947-70E740481C1C}">
+                <a14:useLocalDpi xmlns:a14="http://schemas.microsoft.com/office/drawing/2010/main" val="0"/>
+              </a:ext>
+            </a:extLst>
+          </a:blip>
+          <a:srcRect/>
+          <a:stretch>
+            <a:fillRect/>
+          </a:stretch>
+        </p:blipFill>
+        <p:spPr bwMode="auto">
+          <a:xfrm>
+            <a:off x="179512" y="2780928"/>
+            <a:ext cx="3802023" cy="2376406"/>
+          </a:xfrm>
+          <a:prstGeom prst="rect">
+            <a:avLst/>
+          </a:prstGeom>
+          <a:noFill/>
+          <a:ln>
+            <a:noFill/>
+          </a:ln>
+          <a:effectLst/>
+          <a:extLst>
+            <a:ext uri="{909E8E84-426E-40DD-AFC4-6F175D3DCCD1}">
+              <a14:hiddenFill xmlns:a14="http://schemas.microsoft.com/office/drawing/2010/main">
+                <a:solidFill>
+                  <a:schemeClr val="accent1"/>
+                </a:solidFill>
+              </a14:hiddenFill>
+            </a:ext>
+            <a:ext uri="{91240B29-F687-4F45-9708-019B960494DF}">
+              <a14:hiddenLine xmlns:a14="http://schemas.microsoft.com/office/drawing/2010/main" w="9525">
+                <a:solidFill>
+                  <a:schemeClr val="tx1"/>
+                </a:solidFill>
+                <a:miter lim="800000"/>
+                <a:headEnd/>
+                <a:tailEnd/>
+              </a14:hiddenLine>
+            </a:ext>
+            <a:ext uri="{AF507438-7753-43E0-B8FC-AC1667EBCBE1}">
+              <a14:hiddenEffects xmlns:a14="http://schemas.microsoft.com/office/drawing/2010/main">
+                <a:effectLst>
+                  <a:outerShdw dist="35921" dir="2700000" algn="ctr" rotWithShape="0">
+                    <a:schemeClr val="bg2"/>
+                  </a:outerShdw>
+                </a:effectLst>
+              </a14:hiddenEffects>
+            </a:ext>
+          </a:extLst>
+        </p:spPr>
+      </p:pic>
+      <p:pic>
+        <p:nvPicPr>
+          <p:cNvPr id="2052" name="Picture 4"/>
+          <p:cNvPicPr>
+            <a:picLocks noChangeAspect="1" noChangeArrowheads="1"/>
+          </p:cNvPicPr>
+          <p:nvPr/>
+        </p:nvPicPr>
+        <p:blipFill>
+          <a:blip r:embed="rId5">
+            <a:extLst>
+              <a:ext uri="{28A0092B-C50C-407E-A947-70E740481C1C}">
+                <a14:useLocalDpi xmlns:a14="http://schemas.microsoft.com/office/drawing/2010/main" val="0"/>
+              </a:ext>
+            </a:extLst>
+          </a:blip>
+          <a:srcRect/>
+          <a:stretch>
+            <a:fillRect/>
+          </a:stretch>
+        </p:blipFill>
+        <p:spPr bwMode="auto">
+          <a:xfrm>
+            <a:off x="4139952" y="188640"/>
+            <a:ext cx="2809875" cy="1971675"/>
+          </a:xfrm>
+          <a:prstGeom prst="rect">
+            <a:avLst/>
+          </a:prstGeom>
+          <a:noFill/>
+          <a:ln>
+            <a:noFill/>
+          </a:ln>
+          <a:effectLst/>
+          <a:extLst>
+            <a:ext uri="{909E8E84-426E-40DD-AFC4-6F175D3DCCD1}">
+              <a14:hiddenFill xmlns:a14="http://schemas.microsoft.com/office/drawing/2010/main">
+                <a:solidFill>
+                  <a:schemeClr val="accent1"/>
+                </a:solidFill>
+              </a14:hiddenFill>
+            </a:ext>
+            <a:ext uri="{91240B29-F687-4F45-9708-019B960494DF}">
+              <a14:hiddenLine xmlns:a14="http://schemas.microsoft.com/office/drawing/2010/main" w="9525">
+                <a:solidFill>
+                  <a:schemeClr val="tx1"/>
+                </a:solidFill>
+                <a:miter lim="800000"/>
+                <a:headEnd/>
+                <a:tailEnd/>
+              </a14:hiddenLine>
+            </a:ext>
+            <a:ext uri="{AF507438-7753-43E0-B8FC-AC1667EBCBE1}">
+              <a14:hiddenEffects xmlns:a14="http://schemas.microsoft.com/office/drawing/2010/main">
+                <a:effectLst>
+                  <a:outerShdw dist="35921" dir="2700000" algn="ctr" rotWithShape="0">
+                    <a:schemeClr val="bg2"/>
+                  </a:outerShdw>
+                </a:effectLst>
+              </a14:hiddenEffects>
+            </a:ext>
+          </a:extLst>
+        </p:spPr>
+      </p:pic>
+      <p:pic>
+        <p:nvPicPr>
+          <p:cNvPr id="2053" name="Picture 5"/>
+          <p:cNvPicPr>
+            <a:picLocks noChangeAspect="1" noChangeArrowheads="1"/>
+          </p:cNvPicPr>
+          <p:nvPr/>
+        </p:nvPicPr>
+        <p:blipFill>
+          <a:blip r:embed="rId6">
+            <a:extLst>
+              <a:ext uri="{28A0092B-C50C-407E-A947-70E740481C1C}">
+                <a14:useLocalDpi xmlns:a14="http://schemas.microsoft.com/office/drawing/2010/main" val="0"/>
+              </a:ext>
+            </a:extLst>
+          </a:blip>
+          <a:srcRect/>
+          <a:stretch>
+            <a:fillRect/>
+          </a:stretch>
+        </p:blipFill>
+        <p:spPr bwMode="auto">
+          <a:xfrm>
+            <a:off x="4130401" y="2780928"/>
+            <a:ext cx="3819037" cy="2376406"/>
+          </a:xfrm>
+          <a:prstGeom prst="rect">
+            <a:avLst/>
+          </a:prstGeom>
+          <a:noFill/>
+          <a:ln>
+            <a:noFill/>
+          </a:ln>
+          <a:extLst>
+            <a:ext uri="{909E8E84-426E-40DD-AFC4-6F175D3DCCD1}">
+              <a14:hiddenFill xmlns:a14="http://schemas.microsoft.com/office/drawing/2010/main">
+                <a:solidFill>
+                  <a:schemeClr val="accent1"/>
+                </a:solidFill>
+              </a14:hiddenFill>
+            </a:ext>
+            <a:ext uri="{91240B29-F687-4F45-9708-019B960494DF}">
+              <a14:hiddenLine xmlns:a14="http://schemas.microsoft.com/office/drawing/2010/main" w="9525">
+                <a:solidFill>
+                  <a:schemeClr val="tx1"/>
+                </a:solidFill>
+                <a:miter lim="800000"/>
+                <a:headEnd/>
+                <a:tailEnd/>
+              </a14:hiddenLine>
+            </a:ext>
+          </a:extLst>
+        </p:spPr>
+      </p:pic>
     </p:spTree>
     <p:extLst>
       <p:ext uri="{BB962C8B-B14F-4D97-AF65-F5344CB8AC3E}">
-        <p14:creationId xmlns:p14="http://schemas.microsoft.com/office/powerpoint/2010/main" val="2295238881"/>
+        <p14:creationId xmlns:p14="http://schemas.microsoft.com/office/powerpoint/2010/main" val="427072275"/>
       </p:ext>
     </p:extLst>
   </p:cSld>
   <p:clrMapOvr>
     <a:masterClrMapping/>
   </p:clrMapOvr>
+  <p:timing>
+    <p:tnLst>
+      <p:par>
+        <p:cTn id="1" dur="indefinite" restart="never" nodeType="tmRoot"/>
+      </p:par>
+    </p:tnLst>
+  </p:timing>
 </p:sld>
 </file>
 
@@ -5587,6 +6080,77 @@
 </file>
 
 <file path=ppt/slides/slide25.xml><?xml version="1.0" encoding="utf-8"?>
+<p:sld xmlns:a="http://schemas.openxmlformats.org/drawingml/2006/main" xmlns:r="http://schemas.openxmlformats.org/officeDocument/2006/relationships" xmlns:p="http://schemas.openxmlformats.org/presentationml/2006/main">
+  <p:cSld>
+    <p:spTree>
+      <p:nvGrpSpPr>
+        <p:cNvPr id="1" name=""/>
+        <p:cNvGrpSpPr/>
+        <p:nvPr/>
+      </p:nvGrpSpPr>
+      <p:grpSpPr>
+        <a:xfrm>
+          <a:off x="0" y="0"/>
+          <a:ext cx="0" cy="0"/>
+          <a:chOff x="0" y="0"/>
+          <a:chExt cx="0" cy="0"/>
+        </a:xfrm>
+      </p:grpSpPr>
+      <p:pic>
+        <p:nvPicPr>
+          <p:cNvPr id="2" name="Picture 7" descr="http://thefrugalcomputerguy.com/images/ipeGreen.png"/>
+          <p:cNvPicPr>
+            <a:picLocks noChangeAspect="1" noChangeArrowheads="1"/>
+          </p:cNvPicPr>
+          <p:nvPr/>
+        </p:nvPicPr>
+        <p:blipFill>
+          <a:blip r:embed="rId2">
+            <a:extLst>
+              <a:ext uri="{28A0092B-C50C-407E-A947-70E740481C1C}">
+                <a14:useLocalDpi xmlns:a14="http://schemas.microsoft.com/office/drawing/2010/main" val="0"/>
+              </a:ext>
+            </a:extLst>
+          </a:blip>
+          <a:srcRect/>
+          <a:stretch>
+            <a:fillRect/>
+          </a:stretch>
+        </p:blipFill>
+        <p:spPr bwMode="auto">
+          <a:xfrm>
+            <a:off x="-33537" y="1960"/>
+            <a:ext cx="9203463" cy="6856040"/>
+          </a:xfrm>
+          <a:prstGeom prst="rect">
+            <a:avLst/>
+          </a:prstGeom>
+          <a:noFill/>
+          <a:extLst>
+            <a:ext uri="{909E8E84-426E-40DD-AFC4-6F175D3DCCD1}">
+              <a14:hiddenFill xmlns:a14="http://schemas.microsoft.com/office/drawing/2010/main">
+                <a:solidFill>
+                  <a:srgbClr val="FFFFFF"/>
+                </a:solidFill>
+              </a14:hiddenFill>
+            </a:ext>
+          </a:extLst>
+        </p:spPr>
+      </p:pic>
+    </p:spTree>
+    <p:extLst>
+      <p:ext uri="{BB962C8B-B14F-4D97-AF65-F5344CB8AC3E}">
+        <p14:creationId xmlns:p14="http://schemas.microsoft.com/office/powerpoint/2010/main" val="2295238881"/>
+      </p:ext>
+    </p:extLst>
+  </p:cSld>
+  <p:clrMapOvr>
+    <a:masterClrMapping/>
+  </p:clrMapOvr>
+</p:sld>
+</file>
+
+<file path=ppt/slides/slide26.xml><?xml version="1.0" encoding="utf-8"?>
 <p:sld xmlns:a="http://schemas.openxmlformats.org/drawingml/2006/main" xmlns:r="http://schemas.openxmlformats.org/officeDocument/2006/relationships" xmlns:p="http://schemas.openxmlformats.org/presentationml/2006/main">
   <p:cSld>
     <p:spTree>
@@ -6246,14 +6810,6 @@
                 </a:rPr>
                 <a:t>---Select occupation ---</a:t>
               </a:r>
-              <a:endParaRPr lang="en-SG" dirty="0" smtClean="0">
-                <a:solidFill>
-                  <a:schemeClr val="tx1">
-                    <a:lumMod val="75000"/>
-                    <a:lumOff val="25000"/>
-                  </a:schemeClr>
-                </a:solidFill>
-              </a:endParaRPr>
             </a:p>
             <a:p>
               <a:r>
@@ -6740,14 +7296,138 @@
       </p:grpSpPr>
       <p:pic>
         <p:nvPicPr>
-          <p:cNvPr id="1026" name="Picture 2"/>
+          <p:cNvPr id="28" name="Picture 4"/>
+          <p:cNvPicPr>
+            <a:picLocks noChangeAspect="1" noChangeArrowheads="1"/>
+          </p:cNvPicPr>
+          <p:nvPr/>
+        </p:nvPicPr>
+        <p:blipFill rotWithShape="1">
+          <a:blip r:embed="rId2">
+            <a:extLst>
+              <a:ext uri="{28A0092B-C50C-407E-A947-70E740481C1C}">
+                <a14:useLocalDpi xmlns:a14="http://schemas.microsoft.com/office/drawing/2010/main" val="0"/>
+              </a:ext>
+            </a:extLst>
+          </a:blip>
+          <a:srcRect l="20495" r="10398" b="45746"/>
+          <a:stretch/>
+        </p:blipFill>
+        <p:spPr bwMode="auto">
+          <a:xfrm rot="10800000">
+            <a:off x="318654" y="1738020"/>
+            <a:ext cx="8409710" cy="4632714"/>
+          </a:xfrm>
+          <a:prstGeom prst="rect">
+            <a:avLst/>
+          </a:prstGeom>
+          <a:noFill/>
+          <a:ln>
+            <a:noFill/>
+          </a:ln>
+          <a:effectLst/>
+          <a:extLst>
+            <a:ext uri="{909E8E84-426E-40DD-AFC4-6F175D3DCCD1}">
+              <a14:hiddenFill xmlns:a14="http://schemas.microsoft.com/office/drawing/2010/main">
+                <a:solidFill>
+                  <a:schemeClr val="accent1"/>
+                </a:solidFill>
+              </a14:hiddenFill>
+            </a:ext>
+            <a:ext uri="{91240B29-F687-4F45-9708-019B960494DF}">
+              <a14:hiddenLine xmlns:a14="http://schemas.microsoft.com/office/drawing/2010/main" w="9525">
+                <a:solidFill>
+                  <a:schemeClr val="tx1"/>
+                </a:solidFill>
+                <a:miter lim="800000"/>
+                <a:headEnd/>
+                <a:tailEnd/>
+              </a14:hiddenLine>
+            </a:ext>
+            <a:ext uri="{AF507438-7753-43E0-B8FC-AC1667EBCBE1}">
+              <a14:hiddenEffects xmlns:a14="http://schemas.microsoft.com/office/drawing/2010/main">
+                <a:effectLst>
+                  <a:outerShdw dist="35921" dir="2700000" algn="ctr" rotWithShape="0">
+                    <a:schemeClr val="bg2"/>
+                  </a:outerShdw>
+                </a:effectLst>
+              </a14:hiddenEffects>
+            </a:ext>
+          </a:extLst>
+        </p:spPr>
+      </p:pic>
+      <p:pic>
+        <p:nvPicPr>
+          <p:cNvPr id="27" name="Picture 3"/>
+          <p:cNvPicPr>
+            <a:picLocks noChangeAspect="1" noChangeArrowheads="1"/>
+          </p:cNvPicPr>
+          <p:nvPr/>
+        </p:nvPicPr>
+        <p:blipFill rotWithShape="1">
+          <a:blip r:embed="rId3" cstate="print">
+            <a:extLst>
+              <a:ext uri="{28A0092B-C50C-407E-A947-70E740481C1C}">
+                <a14:useLocalDpi xmlns:a14="http://schemas.microsoft.com/office/drawing/2010/main" val="0"/>
+              </a:ext>
+            </a:extLst>
+          </a:blip>
+          <a:srcRect t="22847"/>
+          <a:stretch/>
+        </p:blipFill>
+        <p:spPr bwMode="auto">
+          <a:xfrm>
+            <a:off x="1085581" y="1738020"/>
+            <a:ext cx="7001072" cy="3376169"/>
+          </a:xfrm>
+          <a:prstGeom prst="rect">
+            <a:avLst/>
+          </a:prstGeom>
+          <a:noFill/>
+          <a:ln>
+            <a:noFill/>
+          </a:ln>
+          <a:effectLst/>
+          <a:extLst>
+            <a:ext uri="{909E8E84-426E-40DD-AFC4-6F175D3DCCD1}">
+              <a14:hiddenFill xmlns:a14="http://schemas.microsoft.com/office/drawing/2010/main">
+                <a:solidFill>
+                  <a:schemeClr val="accent1"/>
+                </a:solidFill>
+              </a14:hiddenFill>
+            </a:ext>
+            <a:ext uri="{91240B29-F687-4F45-9708-019B960494DF}">
+              <a14:hiddenLine xmlns:a14="http://schemas.microsoft.com/office/drawing/2010/main" w="9525">
+                <a:solidFill>
+                  <a:schemeClr val="tx1"/>
+                </a:solidFill>
+                <a:miter lim="800000"/>
+                <a:headEnd/>
+                <a:tailEnd/>
+              </a14:hiddenLine>
+            </a:ext>
+            <a:ext uri="{AF507438-7753-43E0-B8FC-AC1667EBCBE1}">
+              <a14:hiddenEffects xmlns:a14="http://schemas.microsoft.com/office/drawing/2010/main">
+                <a:effectLst>
+                  <a:outerShdw dist="35921" dir="2700000" algn="ctr" rotWithShape="0">
+                    <a:schemeClr val="bg2"/>
+                  </a:outerShdw>
+                </a:effectLst>
+              </a14:hiddenEffects>
+            </a:ext>
+          </a:extLst>
+        </p:spPr>
+      </p:pic>
+      <p:pic>
+        <p:nvPicPr>
+          <p:cNvPr id="26" name="Picture 3"/>
           <p:cNvPicPr>
             <a:picLocks noChangeAspect="1" noChangeArrowheads="1"/>
           </p:cNvPicPr>
           <p:nvPr/>
         </p:nvPicPr>
         <p:blipFill>
-          <a:blip r:embed="rId2">
+          <a:blip r:embed="rId4">
             <a:extLst>
               <a:ext uri="{28A0092B-C50C-407E-A947-70E740481C1C}">
                 <a14:useLocalDpi xmlns:a14="http://schemas.microsoft.com/office/drawing/2010/main" val="0"/>
@@ -6761,8 +7441,8 @@
         </p:blipFill>
         <p:spPr bwMode="auto">
           <a:xfrm>
-            <a:off x="0" y="1625077"/>
-            <a:ext cx="9144000" cy="5260307"/>
+            <a:off x="-1588" y="1600200"/>
+            <a:ext cx="9145588" cy="5257800"/>
           </a:xfrm>
           <a:prstGeom prst="rect">
             <a:avLst/>
@@ -6811,7 +7491,7 @@
           <p:nvPr/>
         </p:nvPicPr>
         <p:blipFill>
-          <a:blip r:embed="rId3">
+          <a:blip r:embed="rId5">
             <a:extLst>
               <a:ext uri="{28A0092B-C50C-407E-A947-70E740481C1C}">
                 <a14:useLocalDpi xmlns:a14="http://schemas.microsoft.com/office/drawing/2010/main" val="0"/>
@@ -6856,6 +7536,1180 @@
           </a:extLst>
         </p:spPr>
       </p:pic>
+      <p:sp>
+        <p:nvSpPr>
+          <p:cNvPr id="2" name="TextBox 1"/>
+          <p:cNvSpPr txBox="1"/>
+          <p:nvPr/>
+        </p:nvSpPr>
+        <p:spPr>
+          <a:xfrm>
+            <a:off x="7191084" y="0"/>
+            <a:ext cx="1955279" cy="276999"/>
+          </a:xfrm>
+          <a:prstGeom prst="rect">
+            <a:avLst/>
+          </a:prstGeom>
+          <a:noFill/>
+        </p:spPr>
+        <p:txBody>
+          <a:bodyPr wrap="none" rtlCol="0">
+            <a:spAutoFit/>
+          </a:bodyPr>
+          <a:lstStyle/>
+          <a:p>
+            <a:r>
+              <a:rPr lang="en-SG" sz="1200" dirty="0" smtClean="0"/>
+              <a:t>Click </a:t>
+            </a:r>
+            <a:r>
+              <a:rPr lang="en-SG" sz="1200" dirty="0" smtClean="0">
+                <a:hlinkClick r:id="rId6" action="ppaction://hlinksldjump"/>
+              </a:rPr>
+              <a:t>here </a:t>
+            </a:r>
+            <a:r>
+              <a:rPr lang="en-SG" sz="1200" dirty="0" smtClean="0"/>
+              <a:t>to go to resources</a:t>
+            </a:r>
+            <a:endParaRPr lang="en-SG" sz="1200" dirty="0"/>
+          </a:p>
+        </p:txBody>
+      </p:sp>
+      <p:sp>
+        <p:nvSpPr>
+          <p:cNvPr id="5" name="TextBox 4"/>
+          <p:cNvSpPr txBox="1"/>
+          <p:nvPr/>
+        </p:nvSpPr>
+        <p:spPr>
+          <a:xfrm>
+            <a:off x="2132177" y="46166"/>
+            <a:ext cx="2975751" cy="646331"/>
+          </a:xfrm>
+          <a:prstGeom prst="rect">
+            <a:avLst/>
+          </a:prstGeom>
+          <a:noFill/>
+        </p:spPr>
+        <p:txBody>
+          <a:bodyPr wrap="none" rtlCol="0">
+            <a:spAutoFit/>
+          </a:bodyPr>
+          <a:lstStyle/>
+          <a:p>
+            <a:r>
+              <a:rPr lang="en-SG" sz="1200" b="1" u="sng" dirty="0" smtClean="0"/>
+              <a:t>FONT</a:t>
+            </a:r>
+          </a:p>
+          <a:p>
+            <a:r>
+              <a:rPr lang="en-SG" sz="1200" dirty="0" err="1" smtClean="0"/>
+              <a:t>CHAWPby</a:t>
+            </a:r>
+            <a:r>
+              <a:rPr lang="en-SG" sz="1200" dirty="0" err="1" smtClean="0">
+                <a:hlinkClick r:id="rId7"/>
+              </a:rPr>
+              <a:t>Tyler</a:t>
+            </a:r>
+            <a:r>
+              <a:rPr lang="en-SG" sz="1200" dirty="0" smtClean="0">
+                <a:hlinkClick r:id="rId7"/>
+              </a:rPr>
+              <a:t> </a:t>
+            </a:r>
+            <a:r>
+              <a:rPr lang="en-SG" sz="1200" dirty="0" err="1" smtClean="0">
+                <a:hlinkClick r:id="rId7"/>
+              </a:rPr>
+              <a:t>Finck</a:t>
+            </a:r>
+            <a:endParaRPr lang="en-SG" sz="1200" dirty="0" smtClean="0"/>
+          </a:p>
+          <a:p>
+            <a:r>
+              <a:rPr lang="en-SG" sz="1200" dirty="0"/>
+              <a:t>http://www.1001fonts.com/chalk-fonts.html</a:t>
+            </a:r>
+          </a:p>
+        </p:txBody>
+      </p:sp>
+      <p:pic>
+        <p:nvPicPr>
+          <p:cNvPr id="3079" name="Picture 7" descr="CHAWP Regular"/>
+          <p:cNvPicPr>
+            <a:picLocks noChangeAspect="1" noChangeArrowheads="1"/>
+          </p:cNvPicPr>
+          <p:nvPr/>
+        </p:nvPicPr>
+        <p:blipFill>
+          <a:blip r:embed="rId8">
+            <a:extLst>
+              <a:ext uri="{28A0092B-C50C-407E-A947-70E740481C1C}">
+                <a14:useLocalDpi xmlns:a14="http://schemas.microsoft.com/office/drawing/2010/main" val="0"/>
+              </a:ext>
+            </a:extLst>
+          </a:blip>
+          <a:srcRect/>
+          <a:stretch>
+            <a:fillRect/>
+          </a:stretch>
+        </p:blipFill>
+        <p:spPr bwMode="auto">
+          <a:xfrm>
+            <a:off x="1141962" y="2592338"/>
+            <a:ext cx="2880320" cy="156162"/>
+          </a:xfrm>
+          <a:prstGeom prst="rect">
+            <a:avLst/>
+          </a:prstGeom>
+          <a:noFill/>
+          <a:extLst>
+            <a:ext uri="{909E8E84-426E-40DD-AFC4-6F175D3DCCD1}">
+              <a14:hiddenFill xmlns:a14="http://schemas.microsoft.com/office/drawing/2010/main">
+                <a:solidFill>
+                  <a:srgbClr val="FFFFFF"/>
+                </a:solidFill>
+              </a14:hiddenFill>
+            </a:ext>
+          </a:extLst>
+        </p:spPr>
+      </p:pic>
+      <p:pic>
+        <p:nvPicPr>
+          <p:cNvPr id="12" name="Picture 7" descr="CHAWP Regular"/>
+          <p:cNvPicPr>
+            <a:picLocks noChangeAspect="1" noChangeArrowheads="1"/>
+          </p:cNvPicPr>
+          <p:nvPr/>
+        </p:nvPicPr>
+        <p:blipFill>
+          <a:blip r:embed="rId8">
+            <a:extLst>
+              <a:ext uri="{28A0092B-C50C-407E-A947-70E740481C1C}">
+                <a14:useLocalDpi xmlns:a14="http://schemas.microsoft.com/office/drawing/2010/main" val="0"/>
+              </a:ext>
+            </a:extLst>
+          </a:blip>
+          <a:srcRect/>
+          <a:stretch>
+            <a:fillRect/>
+          </a:stretch>
+        </p:blipFill>
+        <p:spPr bwMode="auto">
+          <a:xfrm>
+            <a:off x="1141962" y="2770062"/>
+            <a:ext cx="2880320" cy="156162"/>
+          </a:xfrm>
+          <a:prstGeom prst="rect">
+            <a:avLst/>
+          </a:prstGeom>
+          <a:noFill/>
+          <a:extLst>
+            <a:ext uri="{909E8E84-426E-40DD-AFC4-6F175D3DCCD1}">
+              <a14:hiddenFill xmlns:a14="http://schemas.microsoft.com/office/drawing/2010/main">
+                <a:solidFill>
+                  <a:srgbClr val="FFFFFF"/>
+                </a:solidFill>
+              </a14:hiddenFill>
+            </a:ext>
+          </a:extLst>
+        </p:spPr>
+      </p:pic>
+      <p:pic>
+        <p:nvPicPr>
+          <p:cNvPr id="13" name="Picture 7" descr="CHAWP Regular"/>
+          <p:cNvPicPr>
+            <a:picLocks noChangeAspect="1" noChangeArrowheads="1"/>
+          </p:cNvPicPr>
+          <p:nvPr/>
+        </p:nvPicPr>
+        <p:blipFill>
+          <a:blip r:embed="rId8">
+            <a:extLst>
+              <a:ext uri="{28A0092B-C50C-407E-A947-70E740481C1C}">
+                <a14:useLocalDpi xmlns:a14="http://schemas.microsoft.com/office/drawing/2010/main" val="0"/>
+              </a:ext>
+            </a:extLst>
+          </a:blip>
+          <a:srcRect/>
+          <a:stretch>
+            <a:fillRect/>
+          </a:stretch>
+        </p:blipFill>
+        <p:spPr bwMode="auto">
+          <a:xfrm>
+            <a:off x="1141962" y="2996952"/>
+            <a:ext cx="2880320" cy="156162"/>
+          </a:xfrm>
+          <a:prstGeom prst="rect">
+            <a:avLst/>
+          </a:prstGeom>
+          <a:noFill/>
+          <a:extLst>
+            <a:ext uri="{909E8E84-426E-40DD-AFC4-6F175D3DCCD1}">
+              <a14:hiddenFill xmlns:a14="http://schemas.microsoft.com/office/drawing/2010/main">
+                <a:solidFill>
+                  <a:srgbClr val="FFFFFF"/>
+                </a:solidFill>
+              </a14:hiddenFill>
+            </a:ext>
+          </a:extLst>
+        </p:spPr>
+      </p:pic>
+      <p:pic>
+        <p:nvPicPr>
+          <p:cNvPr id="3081" name="Picture 9" descr="http://vignette3.wikia.nocookie.net/totalwarfare/images/5/52/50e61cc3afa96f3a17000038.jpg/revision/latest?cb=20151109154052"/>
+          <p:cNvPicPr>
+            <a:picLocks noChangeAspect="1" noChangeArrowheads="1"/>
+          </p:cNvPicPr>
+          <p:nvPr/>
+        </p:nvPicPr>
+        <p:blipFill>
+          <a:blip r:embed="rId9" cstate="print">
+            <a:extLst>
+              <a:ext uri="{28A0092B-C50C-407E-A947-70E740481C1C}">
+                <a14:useLocalDpi xmlns:a14="http://schemas.microsoft.com/office/drawing/2010/main" val="0"/>
+              </a:ext>
+            </a:extLst>
+          </a:blip>
+          <a:srcRect/>
+          <a:stretch>
+            <a:fillRect/>
+          </a:stretch>
+        </p:blipFill>
+        <p:spPr bwMode="auto">
+          <a:xfrm>
+            <a:off x="4233837" y="2770062"/>
+            <a:ext cx="3836393" cy="2157971"/>
+          </a:xfrm>
+          <a:prstGeom prst="rect">
+            <a:avLst/>
+          </a:prstGeom>
+          <a:noFill/>
+          <a:extLst>
+            <a:ext uri="{909E8E84-426E-40DD-AFC4-6F175D3DCCD1}">
+              <a14:hiddenFill xmlns:a14="http://schemas.microsoft.com/office/drawing/2010/main">
+                <a:solidFill>
+                  <a:srgbClr val="FFFFFF"/>
+                </a:solidFill>
+              </a14:hiddenFill>
+            </a:ext>
+          </a:extLst>
+        </p:spPr>
+      </p:pic>
+      <p:sp>
+        <p:nvSpPr>
+          <p:cNvPr id="6" name="Cloud Callout 5"/>
+          <p:cNvSpPr/>
+          <p:nvPr/>
+        </p:nvSpPr>
+        <p:spPr>
+          <a:xfrm>
+            <a:off x="4233837" y="2770062"/>
+            <a:ext cx="1256850" cy="1008112"/>
+          </a:xfrm>
+          <a:prstGeom prst="cloudCallout">
+            <a:avLst>
+              <a:gd name="adj1" fmla="val 47840"/>
+              <a:gd name="adj2" fmla="val 56214"/>
+            </a:avLst>
+          </a:prstGeom>
+          <a:solidFill>
+            <a:schemeClr val="bg1"/>
+          </a:solidFill>
+          <a:ln>
+            <a:solidFill>
+              <a:schemeClr val="bg1"/>
+            </a:solidFill>
+          </a:ln>
+          <a:effectLst>
+            <a:softEdge rad="31750"/>
+          </a:effectLst>
+        </p:spPr>
+        <p:style>
+          <a:lnRef idx="2">
+            <a:schemeClr val="accent1">
+              <a:shade val="50000"/>
+            </a:schemeClr>
+          </a:lnRef>
+          <a:fillRef idx="1">
+            <a:schemeClr val="accent1"/>
+          </a:fillRef>
+          <a:effectRef idx="0">
+            <a:schemeClr val="accent1"/>
+          </a:effectRef>
+          <a:fontRef idx="minor">
+            <a:schemeClr val="lt1"/>
+          </a:fontRef>
+        </p:style>
+        <p:txBody>
+          <a:bodyPr rtlCol="0" anchor="ctr"/>
+          <a:lstStyle/>
+          <a:p>
+            <a:pPr algn="ctr"/>
+            <a:r>
+              <a:rPr lang="en-SG" sz="900" dirty="0" smtClean="0">
+                <a:solidFill>
+                  <a:schemeClr val="tx1">
+                    <a:alpha val="66000"/>
+                  </a:schemeClr>
+                </a:solidFill>
+              </a:rPr>
+              <a:t>How do I answer this question, should I pass?</a:t>
+            </a:r>
+            <a:endParaRPr lang="en-SG" sz="900" dirty="0">
+              <a:solidFill>
+                <a:schemeClr val="tx1">
+                  <a:alpha val="66000"/>
+                </a:schemeClr>
+              </a:solidFill>
+            </a:endParaRPr>
+          </a:p>
+        </p:txBody>
+      </p:sp>
+      <p:grpSp>
+        <p:nvGrpSpPr>
+          <p:cNvPr id="19" name="Group 18"/>
+          <p:cNvGrpSpPr/>
+          <p:nvPr/>
+        </p:nvGrpSpPr>
+        <p:grpSpPr>
+          <a:xfrm>
+            <a:off x="1229675" y="3795544"/>
+            <a:ext cx="1967308" cy="777757"/>
+            <a:chOff x="6019187" y="1963142"/>
+            <a:chExt cx="1967308" cy="777757"/>
+          </a:xfrm>
+        </p:grpSpPr>
+        <p:pic>
+          <p:nvPicPr>
+            <p:cNvPr id="3082" name="Picture 10"/>
+            <p:cNvPicPr>
+              <a:picLocks noChangeAspect="1" noChangeArrowheads="1"/>
+            </p:cNvPicPr>
+            <p:nvPr/>
+          </p:nvPicPr>
+          <p:blipFill>
+            <a:blip r:embed="rId10">
+              <a:extLst>
+                <a:ext uri="{28A0092B-C50C-407E-A947-70E740481C1C}">
+                  <a14:useLocalDpi xmlns:a14="http://schemas.microsoft.com/office/drawing/2010/main" val="0"/>
+                </a:ext>
+              </a:extLst>
+            </a:blip>
+            <a:srcRect/>
+            <a:stretch>
+              <a:fillRect/>
+            </a:stretch>
+          </p:blipFill>
+          <p:spPr bwMode="auto">
+            <a:xfrm>
+              <a:off x="6019187" y="1963142"/>
+              <a:ext cx="1905000" cy="276225"/>
+            </a:xfrm>
+            <a:prstGeom prst="rect">
+              <a:avLst/>
+            </a:prstGeom>
+            <a:noFill/>
+            <a:ln>
+              <a:noFill/>
+            </a:ln>
+            <a:effectLst/>
+            <a:extLst>
+              <a:ext uri="{909E8E84-426E-40DD-AFC4-6F175D3DCCD1}">
+                <a14:hiddenFill xmlns:a14="http://schemas.microsoft.com/office/drawing/2010/main">
+                  <a:solidFill>
+                    <a:schemeClr val="accent1"/>
+                  </a:solidFill>
+                </a14:hiddenFill>
+              </a:ext>
+              <a:ext uri="{91240B29-F687-4F45-9708-019B960494DF}">
+                <a14:hiddenLine xmlns:a14="http://schemas.microsoft.com/office/drawing/2010/main" w="9525">
+                  <a:solidFill>
+                    <a:schemeClr val="tx1"/>
+                  </a:solidFill>
+                  <a:miter lim="800000"/>
+                  <a:headEnd/>
+                  <a:tailEnd/>
+                </a14:hiddenLine>
+              </a:ext>
+              <a:ext uri="{AF507438-7753-43E0-B8FC-AC1667EBCBE1}">
+                <a14:hiddenEffects xmlns:a14="http://schemas.microsoft.com/office/drawing/2010/main">
+                  <a:effectLst>
+                    <a:outerShdw dist="35921" dir="2700000" algn="ctr" rotWithShape="0">
+                      <a:schemeClr val="bg2"/>
+                    </a:outerShdw>
+                  </a:effectLst>
+                </a14:hiddenEffects>
+              </a:ext>
+            </a:extLst>
+          </p:spPr>
+        </p:pic>
+        <p:pic>
+          <p:nvPicPr>
+            <p:cNvPr id="3085" name="Picture 13"/>
+            <p:cNvPicPr>
+              <a:picLocks noChangeAspect="1" noChangeArrowheads="1"/>
+            </p:cNvPicPr>
+            <p:nvPr/>
+          </p:nvPicPr>
+          <p:blipFill>
+            <a:blip r:embed="rId11">
+              <a:extLst>
+                <a:ext uri="{28A0092B-C50C-407E-A947-70E740481C1C}">
+                  <a14:useLocalDpi xmlns:a14="http://schemas.microsoft.com/office/drawing/2010/main" val="0"/>
+                </a:ext>
+              </a:extLst>
+            </a:blip>
+            <a:srcRect/>
+            <a:stretch>
+              <a:fillRect/>
+            </a:stretch>
+          </p:blipFill>
+          <p:spPr bwMode="auto">
+            <a:xfrm>
+              <a:off x="6019187" y="2288679"/>
+              <a:ext cx="1905000" cy="276225"/>
+            </a:xfrm>
+            <a:prstGeom prst="rect">
+              <a:avLst/>
+            </a:prstGeom>
+            <a:noFill/>
+            <a:ln>
+              <a:noFill/>
+            </a:ln>
+            <a:effectLst/>
+            <a:extLst>
+              <a:ext uri="{909E8E84-426E-40DD-AFC4-6F175D3DCCD1}">
+                <a14:hiddenFill xmlns:a14="http://schemas.microsoft.com/office/drawing/2010/main">
+                  <a:solidFill>
+                    <a:schemeClr val="accent1"/>
+                  </a:solidFill>
+                </a14:hiddenFill>
+              </a:ext>
+              <a:ext uri="{91240B29-F687-4F45-9708-019B960494DF}">
+                <a14:hiddenLine xmlns:a14="http://schemas.microsoft.com/office/drawing/2010/main" w="9525">
+                  <a:solidFill>
+                    <a:schemeClr val="tx1"/>
+                  </a:solidFill>
+                  <a:miter lim="800000"/>
+                  <a:headEnd/>
+                  <a:tailEnd/>
+                </a14:hiddenLine>
+              </a:ext>
+              <a:ext uri="{AF507438-7753-43E0-B8FC-AC1667EBCBE1}">
+                <a14:hiddenEffects xmlns:a14="http://schemas.microsoft.com/office/drawing/2010/main">
+                  <a:effectLst>
+                    <a:outerShdw dist="35921" dir="2700000" algn="ctr" rotWithShape="0">
+                      <a:schemeClr val="bg2"/>
+                    </a:outerShdw>
+                  </a:effectLst>
+                </a14:hiddenEffects>
+              </a:ext>
+            </a:extLst>
+          </p:spPr>
+        </p:pic>
+        <p:sp>
+          <p:nvSpPr>
+            <p:cNvPr id="8" name="TextBox 7"/>
+            <p:cNvSpPr txBox="1"/>
+            <p:nvPr/>
+          </p:nvSpPr>
+          <p:spPr>
+            <a:xfrm>
+              <a:off x="7191084" y="2540844"/>
+              <a:ext cx="795411" cy="200055"/>
+            </a:xfrm>
+            <a:prstGeom prst="rect">
+              <a:avLst/>
+            </a:prstGeom>
+            <a:noFill/>
+          </p:spPr>
+          <p:txBody>
+            <a:bodyPr wrap="none" rtlCol="0">
+              <a:spAutoFit/>
+            </a:bodyPr>
+            <a:lstStyle/>
+            <a:p>
+              <a:r>
+                <a:rPr lang="en-SG" sz="700" u="sng" dirty="0" smtClean="0"/>
+                <a:t>Forget password</a:t>
+              </a:r>
+              <a:endParaRPr lang="en-SG" sz="700" u="sng" dirty="0"/>
+            </a:p>
+          </p:txBody>
+        </p:sp>
+      </p:grpSp>
+      <p:pic>
+        <p:nvPicPr>
+          <p:cNvPr id="3087" name="Picture 15" descr="CHAWP Regular"/>
+          <p:cNvPicPr>
+            <a:picLocks noChangeAspect="1" noChangeArrowheads="1"/>
+          </p:cNvPicPr>
+          <p:nvPr/>
+        </p:nvPicPr>
+        <p:blipFill>
+          <a:blip r:embed="rId12">
+            <a:extLst>
+              <a:ext uri="{28A0092B-C50C-407E-A947-70E740481C1C}">
+                <a14:useLocalDpi xmlns:a14="http://schemas.microsoft.com/office/drawing/2010/main" val="0"/>
+              </a:ext>
+            </a:extLst>
+          </a:blip>
+          <a:srcRect/>
+          <a:stretch>
+            <a:fillRect/>
+          </a:stretch>
+        </p:blipFill>
+        <p:spPr bwMode="auto">
+          <a:xfrm>
+            <a:off x="1141962" y="3195436"/>
+            <a:ext cx="1314450" cy="171450"/>
+          </a:xfrm>
+          <a:prstGeom prst="rect">
+            <a:avLst/>
+          </a:prstGeom>
+          <a:noFill/>
+          <a:extLst>
+            <a:ext uri="{909E8E84-426E-40DD-AFC4-6F175D3DCCD1}">
+              <a14:hiddenFill xmlns:a14="http://schemas.microsoft.com/office/drawing/2010/main">
+                <a:solidFill>
+                  <a:srgbClr val="FFFFFF"/>
+                </a:solidFill>
+              </a14:hiddenFill>
+            </a:ext>
+          </a:extLst>
+        </p:spPr>
+      </p:pic>
+      <p:pic>
+        <p:nvPicPr>
+          <p:cNvPr id="3089" name="Picture 17" descr="Eraser Regular"/>
+          <p:cNvPicPr>
+            <a:picLocks noChangeAspect="1" noChangeArrowheads="1"/>
+          </p:cNvPicPr>
+          <p:nvPr/>
+        </p:nvPicPr>
+        <p:blipFill>
+          <a:blip r:embed="rId13">
+            <a:extLst>
+              <a:ext uri="{28A0092B-C50C-407E-A947-70E740481C1C}">
+                <a14:useLocalDpi xmlns:a14="http://schemas.microsoft.com/office/drawing/2010/main" val="0"/>
+              </a:ext>
+            </a:extLst>
+          </a:blip>
+          <a:srcRect/>
+          <a:stretch>
+            <a:fillRect/>
+          </a:stretch>
+        </p:blipFill>
+        <p:spPr bwMode="auto">
+          <a:xfrm>
+            <a:off x="2799277" y="2243732"/>
+            <a:ext cx="3333750" cy="161925"/>
+          </a:xfrm>
+          <a:prstGeom prst="rect">
+            <a:avLst/>
+          </a:prstGeom>
+          <a:noFill/>
+          <a:extLst>
+            <a:ext uri="{909E8E84-426E-40DD-AFC4-6F175D3DCCD1}">
+              <a14:hiddenFill xmlns:a14="http://schemas.microsoft.com/office/drawing/2010/main">
+                <a:solidFill>
+                  <a:srgbClr val="FFFFFF"/>
+                </a:solidFill>
+              </a14:hiddenFill>
+            </a:ext>
+          </a:extLst>
+        </p:spPr>
+      </p:pic>
+      <p:pic>
+        <p:nvPicPr>
+          <p:cNvPr id="3091" name="Picture 19" descr="http://www.axis.com/sites/default/files/three-dots_0.png"/>
+          <p:cNvPicPr>
+            <a:picLocks noChangeAspect="1" noChangeArrowheads="1"/>
+          </p:cNvPicPr>
+          <p:nvPr/>
+        </p:nvPicPr>
+        <p:blipFill>
+          <a:blip r:embed="rId14" cstate="print">
+            <a:extLst>
+              <a:ext uri="{28A0092B-C50C-407E-A947-70E740481C1C}">
+                <a14:useLocalDpi xmlns:a14="http://schemas.microsoft.com/office/drawing/2010/main" val="0"/>
+              </a:ext>
+            </a:extLst>
+          </a:blip>
+          <a:srcRect/>
+          <a:stretch>
+            <a:fillRect/>
+          </a:stretch>
+        </p:blipFill>
+        <p:spPr bwMode="auto">
+          <a:xfrm>
+            <a:off x="5620418" y="4229100"/>
+            <a:ext cx="1063229" cy="1063229"/>
+          </a:xfrm>
+          <a:prstGeom prst="rect">
+            <a:avLst/>
+          </a:prstGeom>
+          <a:noFill/>
+          <a:extLst>
+            <a:ext uri="{909E8E84-426E-40DD-AFC4-6F175D3DCCD1}">
+              <a14:hiddenFill xmlns:a14="http://schemas.microsoft.com/office/drawing/2010/main">
+                <a:solidFill>
+                  <a:srgbClr val="FFFFFF"/>
+                </a:solidFill>
+              </a14:hiddenFill>
+            </a:ext>
+          </a:extLst>
+        </p:spPr>
+      </p:pic>
+      <p:sp>
+        <p:nvSpPr>
+          <p:cNvPr id="9" name="Rectangle 8"/>
+          <p:cNvSpPr/>
+          <p:nvPr/>
+        </p:nvSpPr>
+        <p:spPr>
+          <a:xfrm>
+            <a:off x="1115616" y="6093296"/>
+            <a:ext cx="6912768" cy="144016"/>
+          </a:xfrm>
+          <a:prstGeom prst="rect">
+            <a:avLst/>
+          </a:prstGeom>
+          <a:solidFill>
+            <a:srgbClr val="D8C07E"/>
+          </a:solidFill>
+          <a:ln>
+            <a:solidFill>
+              <a:srgbClr val="D8C07E"/>
+            </a:solidFill>
+          </a:ln>
+        </p:spPr>
+        <p:style>
+          <a:lnRef idx="2">
+            <a:schemeClr val="accent1">
+              <a:shade val="50000"/>
+            </a:schemeClr>
+          </a:lnRef>
+          <a:fillRef idx="1">
+            <a:schemeClr val="accent1"/>
+          </a:fillRef>
+          <a:effectRef idx="0">
+            <a:schemeClr val="accent1"/>
+          </a:effectRef>
+          <a:fontRef idx="minor">
+            <a:schemeClr val="lt1"/>
+          </a:fontRef>
+        </p:style>
+        <p:txBody>
+          <a:bodyPr rtlCol="0" anchor="ctr"/>
+          <a:lstStyle/>
+          <a:p>
+            <a:r>
+              <a:rPr lang="en-SG" sz="700" dirty="0" smtClean="0">
+                <a:solidFill>
+                  <a:schemeClr val="tx1">
+                    <a:lumMod val="65000"/>
+                    <a:lumOff val="35000"/>
+                  </a:schemeClr>
+                </a:solidFill>
+              </a:rPr>
+              <a:t>@copyright bomb squad</a:t>
+            </a:r>
+            <a:endParaRPr lang="en-SG" sz="700" dirty="0">
+              <a:solidFill>
+                <a:schemeClr val="tx1">
+                  <a:lumMod val="65000"/>
+                  <a:lumOff val="35000"/>
+                </a:schemeClr>
+              </a:solidFill>
+            </a:endParaRPr>
+          </a:p>
+        </p:txBody>
+      </p:sp>
+      <p:sp>
+        <p:nvSpPr>
+          <p:cNvPr id="10" name="Oval 9"/>
+          <p:cNvSpPr/>
+          <p:nvPr/>
+        </p:nvSpPr>
+        <p:spPr>
+          <a:xfrm>
+            <a:off x="1325818" y="5147633"/>
+            <a:ext cx="887511" cy="887511"/>
+          </a:xfrm>
+          <a:prstGeom prst="ellipse">
+            <a:avLst/>
+          </a:prstGeom>
+        </p:spPr>
+        <p:style>
+          <a:lnRef idx="3">
+            <a:schemeClr val="lt1"/>
+          </a:lnRef>
+          <a:fillRef idx="1">
+            <a:schemeClr val="accent5"/>
+          </a:fillRef>
+          <a:effectRef idx="1">
+            <a:schemeClr val="accent5"/>
+          </a:effectRef>
+          <a:fontRef idx="minor">
+            <a:schemeClr val="lt1"/>
+          </a:fontRef>
+        </p:style>
+        <p:txBody>
+          <a:bodyPr rtlCol="0" anchor="ctr"/>
+          <a:lstStyle/>
+          <a:p>
+            <a:pPr algn="ctr"/>
+            <a:endParaRPr lang="en-SG"/>
+          </a:p>
+        </p:txBody>
+      </p:sp>
+      <p:sp>
+        <p:nvSpPr>
+          <p:cNvPr id="30" name="Oval 29"/>
+          <p:cNvSpPr/>
+          <p:nvPr/>
+        </p:nvSpPr>
+        <p:spPr>
+          <a:xfrm>
+            <a:off x="3116503" y="5141016"/>
+            <a:ext cx="887511" cy="887511"/>
+          </a:xfrm>
+          <a:prstGeom prst="ellipse">
+            <a:avLst/>
+          </a:prstGeom>
+        </p:spPr>
+        <p:style>
+          <a:lnRef idx="3">
+            <a:schemeClr val="lt1"/>
+          </a:lnRef>
+          <a:fillRef idx="1">
+            <a:schemeClr val="accent5"/>
+          </a:fillRef>
+          <a:effectRef idx="1">
+            <a:schemeClr val="accent5"/>
+          </a:effectRef>
+          <a:fontRef idx="minor">
+            <a:schemeClr val="lt1"/>
+          </a:fontRef>
+        </p:style>
+        <p:txBody>
+          <a:bodyPr rtlCol="0" anchor="ctr"/>
+          <a:lstStyle/>
+          <a:p>
+            <a:pPr algn="ctr"/>
+            <a:endParaRPr lang="en-SG"/>
+          </a:p>
+        </p:txBody>
+      </p:sp>
+      <p:sp>
+        <p:nvSpPr>
+          <p:cNvPr id="31" name="Oval 30"/>
+          <p:cNvSpPr/>
+          <p:nvPr/>
+        </p:nvSpPr>
+        <p:spPr>
+          <a:xfrm>
+            <a:off x="4763234" y="5147632"/>
+            <a:ext cx="887511" cy="887511"/>
+          </a:xfrm>
+          <a:prstGeom prst="ellipse">
+            <a:avLst/>
+          </a:prstGeom>
+        </p:spPr>
+        <p:style>
+          <a:lnRef idx="3">
+            <a:schemeClr val="lt1"/>
+          </a:lnRef>
+          <a:fillRef idx="1">
+            <a:schemeClr val="accent5"/>
+          </a:fillRef>
+          <a:effectRef idx="1">
+            <a:schemeClr val="accent5"/>
+          </a:effectRef>
+          <a:fontRef idx="minor">
+            <a:schemeClr val="lt1"/>
+          </a:fontRef>
+        </p:style>
+        <p:txBody>
+          <a:bodyPr rtlCol="0" anchor="ctr"/>
+          <a:lstStyle/>
+          <a:p>
+            <a:pPr algn="ctr"/>
+            <a:endParaRPr lang="en-SG"/>
+          </a:p>
+        </p:txBody>
+      </p:sp>
+      <p:sp>
+        <p:nvSpPr>
+          <p:cNvPr id="32" name="Oval 31"/>
+          <p:cNvSpPr/>
+          <p:nvPr/>
+        </p:nvSpPr>
+        <p:spPr>
+          <a:xfrm>
+            <a:off x="6527931" y="5147633"/>
+            <a:ext cx="887511" cy="887511"/>
+          </a:xfrm>
+          <a:prstGeom prst="ellipse">
+            <a:avLst/>
+          </a:prstGeom>
+        </p:spPr>
+        <p:style>
+          <a:lnRef idx="3">
+            <a:schemeClr val="lt1"/>
+          </a:lnRef>
+          <a:fillRef idx="1">
+            <a:schemeClr val="accent5"/>
+          </a:fillRef>
+          <a:effectRef idx="1">
+            <a:schemeClr val="accent5"/>
+          </a:effectRef>
+          <a:fontRef idx="minor">
+            <a:schemeClr val="lt1"/>
+          </a:fontRef>
+        </p:style>
+        <p:txBody>
+          <a:bodyPr rtlCol="0" anchor="ctr"/>
+          <a:lstStyle/>
+          <a:p>
+            <a:pPr algn="ctr"/>
+            <a:endParaRPr lang="en-SG"/>
+          </a:p>
+        </p:txBody>
+      </p:sp>
+      <p:cxnSp>
+        <p:nvCxnSpPr>
+          <p:cNvPr id="14" name="Straight Arrow Connector 13"/>
+          <p:cNvCxnSpPr/>
+          <p:nvPr/>
+        </p:nvCxnSpPr>
+        <p:spPr>
+          <a:xfrm flipH="1">
+            <a:off x="7092280" y="4025900"/>
+            <a:ext cx="1531020" cy="1565488"/>
+          </a:xfrm>
+          <a:prstGeom prst="straightConnector1">
+            <a:avLst/>
+          </a:prstGeom>
+          <a:ln>
+            <a:tailEnd type="arrow"/>
+          </a:ln>
+        </p:spPr>
+        <p:style>
+          <a:lnRef idx="1">
+            <a:schemeClr val="dk1"/>
+          </a:lnRef>
+          <a:fillRef idx="0">
+            <a:schemeClr val="dk1"/>
+          </a:fillRef>
+          <a:effectRef idx="0">
+            <a:schemeClr val="dk1"/>
+          </a:effectRef>
+          <a:fontRef idx="minor">
+            <a:schemeClr val="tx1"/>
+          </a:fontRef>
+        </p:style>
+      </p:cxnSp>
+      <p:sp>
+        <p:nvSpPr>
+          <p:cNvPr id="15" name="TextBox 14"/>
+          <p:cNvSpPr txBox="1"/>
+          <p:nvPr/>
+        </p:nvSpPr>
+        <p:spPr>
+          <a:xfrm>
+            <a:off x="8276766" y="3679770"/>
+            <a:ext cx="903196" cy="338554"/>
+          </a:xfrm>
+          <a:prstGeom prst="rect">
+            <a:avLst/>
+          </a:prstGeom>
+          <a:noFill/>
+        </p:spPr>
+        <p:txBody>
+          <a:bodyPr wrap="none" rtlCol="0">
+            <a:spAutoFit/>
+          </a:bodyPr>
+          <a:lstStyle/>
+          <a:p>
+            <a:r>
+              <a:rPr lang="en-SG" sz="1600" dirty="0" smtClean="0"/>
+              <a:t>Features</a:t>
+            </a:r>
+            <a:endParaRPr lang="en-SG" sz="1600" dirty="0"/>
+          </a:p>
+        </p:txBody>
+      </p:sp>
+      <p:cxnSp>
+        <p:nvCxnSpPr>
+          <p:cNvPr id="37" name="Straight Arrow Connector 36"/>
+          <p:cNvCxnSpPr/>
+          <p:nvPr/>
+        </p:nvCxnSpPr>
+        <p:spPr>
+          <a:xfrm flipH="1">
+            <a:off x="5206989" y="4025900"/>
+            <a:ext cx="3416311" cy="1419324"/>
+          </a:xfrm>
+          <a:prstGeom prst="straightConnector1">
+            <a:avLst/>
+          </a:prstGeom>
+          <a:ln>
+            <a:tailEnd type="arrow"/>
+          </a:ln>
+        </p:spPr>
+        <p:style>
+          <a:lnRef idx="1">
+            <a:schemeClr val="dk1"/>
+          </a:lnRef>
+          <a:fillRef idx="0">
+            <a:schemeClr val="dk1"/>
+          </a:fillRef>
+          <a:effectRef idx="0">
+            <a:schemeClr val="dk1"/>
+          </a:effectRef>
+          <a:fontRef idx="minor">
+            <a:schemeClr val="tx1"/>
+          </a:fontRef>
+        </p:style>
+      </p:cxnSp>
+      <p:sp>
+        <p:nvSpPr>
+          <p:cNvPr id="41" name="Rectangle 40"/>
+          <p:cNvSpPr/>
+          <p:nvPr/>
+        </p:nvSpPr>
+        <p:spPr>
+          <a:xfrm>
+            <a:off x="1115616" y="1916832"/>
+            <a:ext cx="6912768" cy="216024"/>
+          </a:xfrm>
+          <a:prstGeom prst="rect">
+            <a:avLst/>
+          </a:prstGeom>
+          <a:solidFill>
+            <a:srgbClr val="228E79"/>
+          </a:solidFill>
+          <a:ln>
+            <a:solidFill>
+              <a:srgbClr val="228E79"/>
+            </a:solidFill>
+          </a:ln>
+        </p:spPr>
+        <p:style>
+          <a:lnRef idx="2">
+            <a:schemeClr val="accent1">
+              <a:shade val="50000"/>
+            </a:schemeClr>
+          </a:lnRef>
+          <a:fillRef idx="1">
+            <a:schemeClr val="accent1"/>
+          </a:fillRef>
+          <a:effectRef idx="0">
+            <a:schemeClr val="accent1"/>
+          </a:effectRef>
+          <a:fontRef idx="minor">
+            <a:schemeClr val="lt1"/>
+          </a:fontRef>
+        </p:style>
+        <p:txBody>
+          <a:bodyPr rtlCol="0" anchor="ctr"/>
+          <a:lstStyle/>
+          <a:p>
+            <a:endParaRPr lang="en-SG" sz="700" dirty="0">
+              <a:solidFill>
+                <a:schemeClr val="tx1">
+                  <a:lumMod val="65000"/>
+                  <a:lumOff val="35000"/>
+                </a:schemeClr>
+              </a:solidFill>
+            </a:endParaRPr>
+          </a:p>
+        </p:txBody>
+      </p:sp>
+      <p:sp>
+        <p:nvSpPr>
+          <p:cNvPr id="42" name="Rectangle 41"/>
+          <p:cNvSpPr/>
+          <p:nvPr/>
+        </p:nvSpPr>
+        <p:spPr>
+          <a:xfrm>
+            <a:off x="1115616" y="1916832"/>
+            <a:ext cx="507094" cy="216024"/>
+          </a:xfrm>
+          <a:prstGeom prst="rect">
+            <a:avLst/>
+          </a:prstGeom>
+          <a:solidFill>
+            <a:srgbClr val="16564B"/>
+          </a:solidFill>
+          <a:ln>
+            <a:solidFill>
+              <a:srgbClr val="16564B"/>
+            </a:solidFill>
+          </a:ln>
+        </p:spPr>
+        <p:style>
+          <a:lnRef idx="2">
+            <a:schemeClr val="accent1">
+              <a:shade val="50000"/>
+            </a:schemeClr>
+          </a:lnRef>
+          <a:fillRef idx="1">
+            <a:schemeClr val="accent1"/>
+          </a:fillRef>
+          <a:effectRef idx="0">
+            <a:schemeClr val="accent1"/>
+          </a:effectRef>
+          <a:fontRef idx="minor">
+            <a:schemeClr val="lt1"/>
+          </a:fontRef>
+        </p:style>
+        <p:txBody>
+          <a:bodyPr rtlCol="0" anchor="ctr"/>
+          <a:lstStyle/>
+          <a:p>
+            <a:r>
+              <a:rPr lang="en-SG" sz="800" dirty="0" smtClean="0">
+                <a:solidFill>
+                  <a:schemeClr val="bg1"/>
+                </a:solidFill>
+              </a:rPr>
+              <a:t>Home</a:t>
+            </a:r>
+            <a:endParaRPr lang="en-SG" sz="800" dirty="0">
+              <a:solidFill>
+                <a:schemeClr val="bg1"/>
+              </a:solidFill>
+            </a:endParaRPr>
+          </a:p>
+        </p:txBody>
+      </p:sp>
+      <p:sp>
+        <p:nvSpPr>
+          <p:cNvPr id="43" name="Rectangle 42"/>
+          <p:cNvSpPr/>
+          <p:nvPr/>
+        </p:nvSpPr>
+        <p:spPr>
+          <a:xfrm>
+            <a:off x="1688642" y="1916832"/>
+            <a:ext cx="507094" cy="216024"/>
+          </a:xfrm>
+          <a:prstGeom prst="rect">
+            <a:avLst/>
+          </a:prstGeom>
+          <a:solidFill>
+            <a:srgbClr val="16564B"/>
+          </a:solidFill>
+          <a:ln>
+            <a:solidFill>
+              <a:srgbClr val="16564B"/>
+            </a:solidFill>
+          </a:ln>
+        </p:spPr>
+        <p:style>
+          <a:lnRef idx="2">
+            <a:schemeClr val="accent1">
+              <a:shade val="50000"/>
+            </a:schemeClr>
+          </a:lnRef>
+          <a:fillRef idx="1">
+            <a:schemeClr val="accent1"/>
+          </a:fillRef>
+          <a:effectRef idx="0">
+            <a:schemeClr val="accent1"/>
+          </a:effectRef>
+          <a:fontRef idx="minor">
+            <a:schemeClr val="lt1"/>
+          </a:fontRef>
+        </p:style>
+        <p:txBody>
+          <a:bodyPr rtlCol="0" anchor="ctr"/>
+          <a:lstStyle/>
+          <a:p>
+            <a:r>
+              <a:rPr lang="en-SG" sz="800" dirty="0" smtClean="0">
+                <a:solidFill>
+                  <a:schemeClr val="bg1"/>
+                </a:solidFill>
+              </a:rPr>
+              <a:t>Feature</a:t>
+            </a:r>
+            <a:endParaRPr lang="en-SG" sz="800" dirty="0">
+              <a:solidFill>
+                <a:schemeClr val="bg1"/>
+              </a:solidFill>
+            </a:endParaRPr>
+          </a:p>
+        </p:txBody>
+      </p:sp>
+      <p:sp>
+        <p:nvSpPr>
+          <p:cNvPr id="44" name="Rectangle 43"/>
+          <p:cNvSpPr/>
+          <p:nvPr/>
+        </p:nvSpPr>
+        <p:spPr>
+          <a:xfrm>
+            <a:off x="2264706" y="1916832"/>
+            <a:ext cx="507094" cy="216024"/>
+          </a:xfrm>
+          <a:prstGeom prst="rect">
+            <a:avLst/>
+          </a:prstGeom>
+          <a:solidFill>
+            <a:srgbClr val="16564B"/>
+          </a:solidFill>
+          <a:ln>
+            <a:solidFill>
+              <a:srgbClr val="16564B"/>
+            </a:solidFill>
+          </a:ln>
+        </p:spPr>
+        <p:style>
+          <a:lnRef idx="2">
+            <a:schemeClr val="accent1">
+              <a:shade val="50000"/>
+            </a:schemeClr>
+          </a:lnRef>
+          <a:fillRef idx="1">
+            <a:schemeClr val="accent1"/>
+          </a:fillRef>
+          <a:effectRef idx="0">
+            <a:schemeClr val="accent1"/>
+          </a:effectRef>
+          <a:fontRef idx="minor">
+            <a:schemeClr val="lt1"/>
+          </a:fontRef>
+        </p:style>
+        <p:txBody>
+          <a:bodyPr rtlCol="0" anchor="ctr"/>
+          <a:lstStyle/>
+          <a:p>
+            <a:r>
+              <a:rPr lang="en-SG" sz="800" dirty="0" smtClean="0">
+                <a:solidFill>
+                  <a:schemeClr val="bg1"/>
+                </a:solidFill>
+              </a:rPr>
+              <a:t>Contact</a:t>
+            </a:r>
+            <a:endParaRPr lang="en-SG" sz="800" dirty="0">
+              <a:solidFill>
+                <a:schemeClr val="bg1"/>
+              </a:solidFill>
+            </a:endParaRPr>
+          </a:p>
+        </p:txBody>
+      </p:sp>
     </p:spTree>
     <p:extLst>
       <p:ext uri="{BB962C8B-B14F-4D97-AF65-F5344CB8AC3E}">
@@ -6893,16 +8747,202 @@
           <a:chExt cx="0" cy="0"/>
         </a:xfrm>
       </p:grpSpPr>
+      <p:pic>
+        <p:nvPicPr>
+          <p:cNvPr id="1029" name="Picture 5" descr="Free Bootstrap 3 Themes and Templates"/>
+          <p:cNvPicPr>
+            <a:picLocks noChangeAspect="1" noChangeArrowheads="1"/>
+          </p:cNvPicPr>
+          <p:nvPr/>
+        </p:nvPicPr>
+        <p:blipFill>
+          <a:blip r:embed="rId2">
+            <a:extLst>
+              <a:ext uri="{28A0092B-C50C-407E-A947-70E740481C1C}">
+                <a14:useLocalDpi xmlns:a14="http://schemas.microsoft.com/office/drawing/2010/main" val="0"/>
+              </a:ext>
+            </a:extLst>
+          </a:blip>
+          <a:srcRect/>
+          <a:stretch>
+            <a:fillRect/>
+          </a:stretch>
+        </p:blipFill>
+        <p:spPr bwMode="auto">
+          <a:xfrm>
+            <a:off x="1115616" y="1895475"/>
+            <a:ext cx="6984776" cy="4563388"/>
+          </a:xfrm>
+          <a:prstGeom prst="rect">
+            <a:avLst/>
+          </a:prstGeom>
+          <a:noFill/>
+          <a:extLst>
+            <a:ext uri="{909E8E84-426E-40DD-AFC4-6F175D3DCCD1}">
+              <a14:hiddenFill xmlns:a14="http://schemas.microsoft.com/office/drawing/2010/main">
+                <a:solidFill>
+                  <a:srgbClr val="FFFFFF"/>
+                </a:solidFill>
+              </a14:hiddenFill>
+            </a:ext>
+          </a:extLst>
+        </p:spPr>
+      </p:pic>
+      <p:sp>
+        <p:nvSpPr>
+          <p:cNvPr id="2" name="Rectangle 1"/>
+          <p:cNvSpPr/>
+          <p:nvPr/>
+        </p:nvSpPr>
+        <p:spPr>
+          <a:xfrm>
+            <a:off x="0" y="0"/>
+            <a:ext cx="9144000" cy="923330"/>
+          </a:xfrm>
+          <a:prstGeom prst="rect">
+            <a:avLst/>
+          </a:prstGeom>
+        </p:spPr>
+        <p:txBody>
+          <a:bodyPr wrap="square">
+            <a:spAutoFit/>
+          </a:bodyPr>
+          <a:lstStyle/>
+          <a:p>
+            <a:r>
+              <a:rPr lang="en-SG" dirty="0" smtClean="0"/>
+              <a:t>I recommend this style: </a:t>
+            </a:r>
+            <a:r>
+              <a:rPr lang="en-SG" dirty="0" smtClean="0">
+                <a:hlinkClick r:id="rId3"/>
+              </a:rPr>
+              <a:t>http</a:t>
+            </a:r>
+            <a:r>
+              <a:rPr lang="en-SG" dirty="0">
+                <a:hlinkClick r:id="rId3"/>
+              </a:rPr>
+              <a:t>://</a:t>
+            </a:r>
+            <a:r>
+              <a:rPr lang="en-SG" dirty="0" smtClean="0">
+                <a:hlinkClick r:id="rId3"/>
+              </a:rPr>
+              <a:t>blackrockdigital.github.io/startbootstrap-sb-admin-2/pages/index.html</a:t>
+            </a:r>
+            <a:endParaRPr lang="en-SG" dirty="0" smtClean="0"/>
+          </a:p>
+          <a:p>
+            <a:r>
+              <a:rPr lang="en-SG" dirty="0" smtClean="0"/>
+              <a:t>But this </a:t>
+            </a:r>
+            <a:r>
+              <a:rPr lang="en-SG" dirty="0"/>
+              <a:t>colour scheme: </a:t>
+            </a:r>
+            <a:r>
+              <a:rPr lang="en-SG" dirty="0">
+                <a:hlinkClick r:id="rId4"/>
+              </a:rPr>
+              <a:t>http://blackrockdigital.github.io/startbootstrap-sb-admin</a:t>
+            </a:r>
+            <a:r>
+              <a:rPr lang="en-SG" dirty="0" smtClean="0">
+                <a:hlinkClick r:id="rId4"/>
+              </a:rPr>
+              <a:t>/</a:t>
+            </a:r>
+            <a:r>
+              <a:rPr lang="en-SG" dirty="0" smtClean="0"/>
+              <a:t> </a:t>
+            </a:r>
+            <a:endParaRPr lang="en-SG" dirty="0"/>
+          </a:p>
+        </p:txBody>
+      </p:sp>
+      <p:pic>
+        <p:nvPicPr>
+          <p:cNvPr id="1027" name="Picture 3"/>
+          <p:cNvPicPr>
+            <a:picLocks noChangeAspect="1" noChangeArrowheads="1"/>
+          </p:cNvPicPr>
+          <p:nvPr/>
+        </p:nvPicPr>
+        <p:blipFill>
+          <a:blip r:embed="rId5">
+            <a:extLst>
+              <a:ext uri="{28A0092B-C50C-407E-A947-70E740481C1C}">
+                <a14:useLocalDpi xmlns:a14="http://schemas.microsoft.com/office/drawing/2010/main" val="0"/>
+              </a:ext>
+            </a:extLst>
+          </a:blip>
+          <a:srcRect/>
+          <a:stretch>
+            <a:fillRect/>
+          </a:stretch>
+        </p:blipFill>
+        <p:spPr bwMode="auto">
+          <a:xfrm>
+            <a:off x="-1588" y="1600200"/>
+            <a:ext cx="9145588" cy="5257800"/>
+          </a:xfrm>
+          <a:prstGeom prst="rect">
+            <a:avLst/>
+          </a:prstGeom>
+          <a:noFill/>
+          <a:ln>
+            <a:noFill/>
+          </a:ln>
+          <a:effectLst/>
+          <a:extLst>
+            <a:ext uri="{909E8E84-426E-40DD-AFC4-6F175D3DCCD1}">
+              <a14:hiddenFill xmlns:a14="http://schemas.microsoft.com/office/drawing/2010/main">
+                <a:solidFill>
+                  <a:schemeClr val="accent1"/>
+                </a:solidFill>
+              </a14:hiddenFill>
+            </a:ext>
+            <a:ext uri="{91240B29-F687-4F45-9708-019B960494DF}">
+              <a14:hiddenLine xmlns:a14="http://schemas.microsoft.com/office/drawing/2010/main" w="9525">
+                <a:solidFill>
+                  <a:schemeClr val="tx1"/>
+                </a:solidFill>
+                <a:miter lim="800000"/>
+                <a:headEnd/>
+                <a:tailEnd/>
+              </a14:hiddenLine>
+            </a:ext>
+            <a:ext uri="{AF507438-7753-43E0-B8FC-AC1667EBCBE1}">
+              <a14:hiddenEffects xmlns:a14="http://schemas.microsoft.com/office/drawing/2010/main">
+                <a:effectLst>
+                  <a:outerShdw dist="35921" dir="2700000" algn="ctr" rotWithShape="0">
+                    <a:schemeClr val="bg2"/>
+                  </a:outerShdw>
+                </a:effectLst>
+              </a14:hiddenEffects>
+            </a:ext>
+          </a:extLst>
+        </p:spPr>
+      </p:pic>
     </p:spTree>
     <p:extLst>
       <p:ext uri="{BB962C8B-B14F-4D97-AF65-F5344CB8AC3E}">
-        <p14:creationId xmlns:p14="http://schemas.microsoft.com/office/powerpoint/2010/main" val="944212144"/>
+        <p14:creationId xmlns:p14="http://schemas.microsoft.com/office/powerpoint/2010/main" val="3030568591"/>
       </p:ext>
     </p:extLst>
   </p:cSld>
   <p:clrMapOvr>
     <a:masterClrMapping/>
   </p:clrMapOvr>
+  <p:timing>
+    <p:tnLst>
+      <p:par>
+        <p:cTn id="1" dur="indefinite" restart="never" nodeType="tmRoot"/>
+      </p:par>
+    </p:tnLst>
+  </p:timing>
 </p:sld>
 </file>
 
@@ -6923,285 +8963,10 @@
           <a:chExt cx="0" cy="0"/>
         </a:xfrm>
       </p:grpSpPr>
-      <p:grpSp>
-        <p:nvGrpSpPr>
-          <p:cNvPr id="3" name="Group 2"/>
-          <p:cNvGrpSpPr/>
-          <p:nvPr/>
-        </p:nvGrpSpPr>
-        <p:grpSpPr>
-          <a:xfrm>
-            <a:off x="0" y="-6393"/>
-            <a:ext cx="7020272" cy="6876256"/>
-            <a:chOff x="0" y="-6393"/>
-            <a:chExt cx="7020272" cy="6876256"/>
-          </a:xfrm>
-        </p:grpSpPr>
-        <p:pic>
-          <p:nvPicPr>
-            <p:cNvPr id="3074" name="Picture 2" descr="https://image.freepik.com/free-vector/blue-technology-background_1035-1691.jpg"/>
-            <p:cNvPicPr>
-              <a:picLocks noChangeAspect="1" noChangeArrowheads="1"/>
-            </p:cNvPicPr>
-            <p:nvPr/>
-          </p:nvPicPr>
-          <p:blipFill>
-            <a:blip r:embed="rId2">
-              <a:extLst>
-                <a:ext uri="{28A0092B-C50C-407E-A947-70E740481C1C}">
-                  <a14:useLocalDpi xmlns:a14="http://schemas.microsoft.com/office/drawing/2010/main" val="0"/>
-                </a:ext>
-              </a:extLst>
-            </a:blip>
-            <a:srcRect/>
-            <a:stretch>
-              <a:fillRect/>
-            </a:stretch>
-          </p:blipFill>
-          <p:spPr bwMode="auto">
-            <a:xfrm>
-              <a:off x="0" y="-6393"/>
-              <a:ext cx="6876256" cy="6876256"/>
-            </a:xfrm>
-            <a:prstGeom prst="rect">
-              <a:avLst/>
-            </a:prstGeom>
-            <a:noFill/>
-            <a:extLst>
-              <a:ext uri="{909E8E84-426E-40DD-AFC4-6F175D3DCCD1}">
-                <a14:hiddenFill xmlns:a14="http://schemas.microsoft.com/office/drawing/2010/main">
-                  <a:solidFill>
-                    <a:srgbClr val="FFFFFF"/>
-                  </a:solidFill>
-                </a14:hiddenFill>
-              </a:ext>
-            </a:extLst>
-          </p:spPr>
-        </p:pic>
-        <p:sp>
-          <p:nvSpPr>
-            <p:cNvPr id="2" name="Rectangle 1"/>
-            <p:cNvSpPr/>
-            <p:nvPr/>
-          </p:nvSpPr>
-          <p:spPr>
-            <a:xfrm>
-              <a:off x="4139952" y="3933056"/>
-              <a:ext cx="2880320" cy="648072"/>
-            </a:xfrm>
-            <a:prstGeom prst="rect">
-              <a:avLst/>
-            </a:prstGeom>
-            <a:solidFill>
-              <a:schemeClr val="bg1"/>
-            </a:solidFill>
-            <a:ln>
-              <a:solidFill>
-                <a:schemeClr val="bg1"/>
-              </a:solidFill>
-            </a:ln>
-          </p:spPr>
-          <p:style>
-            <a:lnRef idx="2">
-              <a:schemeClr val="accent1">
-                <a:shade val="50000"/>
-              </a:schemeClr>
-            </a:lnRef>
-            <a:fillRef idx="1">
-              <a:schemeClr val="accent1"/>
-            </a:fillRef>
-            <a:effectRef idx="0">
-              <a:schemeClr val="accent1"/>
-            </a:effectRef>
-            <a:fontRef idx="minor">
-              <a:schemeClr val="lt1"/>
-            </a:fontRef>
-          </p:style>
-          <p:txBody>
-            <a:bodyPr rtlCol="0" anchor="ctr"/>
-            <a:lstStyle/>
-            <a:p>
-              <a:pPr algn="ctr"/>
-              <a:endParaRPr lang="en-SG"/>
-            </a:p>
-          </p:txBody>
-        </p:sp>
-      </p:grpSp>
-      <p:sp>
-        <p:nvSpPr>
-          <p:cNvPr id="4" name="AutoShape 6" descr="Vermin Vibes 2 Black sample text"/>
-          <p:cNvSpPr>
-            <a:spLocks noChangeAspect="1" noChangeArrowheads="1"/>
-          </p:cNvSpPr>
-          <p:nvPr/>
-        </p:nvSpPr>
-        <p:spPr bwMode="auto">
-          <a:xfrm>
-            <a:off x="155575" y="-144463"/>
-            <a:ext cx="304800" cy="304801"/>
-          </a:xfrm>
-          <a:prstGeom prst="rect">
-            <a:avLst/>
-          </a:prstGeom>
-          <a:noFill/>
-          <a:extLst>
-            <a:ext uri="{909E8E84-426E-40DD-AFC4-6F175D3DCCD1}">
-              <a14:hiddenFill xmlns:a14="http://schemas.microsoft.com/office/drawing/2010/main">
-                <a:solidFill>
-                  <a:srgbClr val="FFFFFF"/>
-                </a:solidFill>
-              </a14:hiddenFill>
-            </a:ext>
-          </a:extLst>
-        </p:spPr>
-        <p:txBody>
-          <a:bodyPr vert="horz" wrap="square" lIns="91440" tIns="45720" rIns="91440" bIns="45720" numCol="1" anchor="t" anchorCtr="0" compatLnSpc="1">
-            <a:prstTxWarp prst="textNoShape">
-              <a:avLst/>
-            </a:prstTxWarp>
-          </a:bodyPr>
-          <a:lstStyle/>
-          <a:p>
-            <a:endParaRPr lang="en-SG"/>
-          </a:p>
-        </p:txBody>
-      </p:sp>
-      <p:sp>
-        <p:nvSpPr>
-          <p:cNvPr id="5" name="AutoShape 8" descr="Vermin Vibes 2 Black sample text"/>
-          <p:cNvSpPr>
-            <a:spLocks noChangeAspect="1" noChangeArrowheads="1"/>
-          </p:cNvSpPr>
-          <p:nvPr/>
-        </p:nvSpPr>
-        <p:spPr bwMode="auto">
-          <a:xfrm>
-            <a:off x="307975" y="7937"/>
-            <a:ext cx="304800" cy="304801"/>
-          </a:xfrm>
-          <a:prstGeom prst="rect">
-            <a:avLst/>
-          </a:prstGeom>
-          <a:noFill/>
-          <a:extLst>
-            <a:ext uri="{909E8E84-426E-40DD-AFC4-6F175D3DCCD1}">
-              <a14:hiddenFill xmlns:a14="http://schemas.microsoft.com/office/drawing/2010/main">
-                <a:solidFill>
-                  <a:srgbClr val="FFFFFF"/>
-                </a:solidFill>
-              </a14:hiddenFill>
-            </a:ext>
-          </a:extLst>
-        </p:spPr>
-        <p:txBody>
-          <a:bodyPr vert="horz" wrap="square" lIns="91440" tIns="45720" rIns="91440" bIns="45720" numCol="1" anchor="t" anchorCtr="0" compatLnSpc="1">
-            <a:prstTxWarp prst="textNoShape">
-              <a:avLst/>
-            </a:prstTxWarp>
-          </a:bodyPr>
-          <a:lstStyle/>
-          <a:p>
-            <a:endParaRPr lang="en-SG"/>
-          </a:p>
-        </p:txBody>
-      </p:sp>
-      <p:sp>
-        <p:nvSpPr>
-          <p:cNvPr id="6" name="AutoShape 10" descr="Vermin Vibes 2 Black sample text"/>
-          <p:cNvSpPr>
-            <a:spLocks noChangeAspect="1" noChangeArrowheads="1"/>
-          </p:cNvSpPr>
-          <p:nvPr/>
-        </p:nvSpPr>
-        <p:spPr bwMode="auto">
-          <a:xfrm>
-            <a:off x="460375" y="160337"/>
-            <a:ext cx="304800" cy="304801"/>
-          </a:xfrm>
-          <a:prstGeom prst="rect">
-            <a:avLst/>
-          </a:prstGeom>
-          <a:noFill/>
-          <a:extLst>
-            <a:ext uri="{909E8E84-426E-40DD-AFC4-6F175D3DCCD1}">
-              <a14:hiddenFill xmlns:a14="http://schemas.microsoft.com/office/drawing/2010/main">
-                <a:solidFill>
-                  <a:srgbClr val="FFFFFF"/>
-                </a:solidFill>
-              </a14:hiddenFill>
-            </a:ext>
-          </a:extLst>
-        </p:spPr>
-        <p:txBody>
-          <a:bodyPr vert="horz" wrap="square" lIns="91440" tIns="45720" rIns="91440" bIns="45720" numCol="1" anchor="t" anchorCtr="0" compatLnSpc="1">
-            <a:prstTxWarp prst="textNoShape">
-              <a:avLst/>
-            </a:prstTxWarp>
-          </a:bodyPr>
-          <a:lstStyle/>
-          <a:p>
-            <a:endParaRPr lang="en-SG"/>
-          </a:p>
-        </p:txBody>
-      </p:sp>
-      <p:pic>
-        <p:nvPicPr>
-          <p:cNvPr id="3083" name="Picture 11"/>
-          <p:cNvPicPr>
-            <a:picLocks noChangeAspect="1" noChangeArrowheads="1"/>
-          </p:cNvPicPr>
-          <p:nvPr/>
-        </p:nvPicPr>
-        <p:blipFill>
-          <a:blip r:embed="rId3">
-            <a:extLst>
-              <a:ext uri="{28A0092B-C50C-407E-A947-70E740481C1C}">
-                <a14:useLocalDpi xmlns:a14="http://schemas.microsoft.com/office/drawing/2010/main" val="0"/>
-              </a:ext>
-            </a:extLst>
-          </a:blip>
-          <a:srcRect/>
-          <a:stretch>
-            <a:fillRect/>
-          </a:stretch>
-        </p:blipFill>
-        <p:spPr bwMode="auto">
-          <a:xfrm>
-            <a:off x="4499992" y="3789040"/>
-            <a:ext cx="4171950" cy="628650"/>
-          </a:xfrm>
-          <a:prstGeom prst="rect">
-            <a:avLst/>
-          </a:prstGeom>
-          <a:noFill/>
-          <a:ln>
-            <a:noFill/>
-          </a:ln>
-          <a:extLst>
-            <a:ext uri="{909E8E84-426E-40DD-AFC4-6F175D3DCCD1}">
-              <a14:hiddenFill xmlns:a14="http://schemas.microsoft.com/office/drawing/2010/main">
-                <a:solidFill>
-                  <a:schemeClr val="accent1"/>
-                </a:solidFill>
-              </a14:hiddenFill>
-            </a:ext>
-            <a:ext uri="{91240B29-F687-4F45-9708-019B960494DF}">
-              <a14:hiddenLine xmlns:a14="http://schemas.microsoft.com/office/drawing/2010/main" w="9525">
-                <a:solidFill>
-                  <a:schemeClr val="tx1"/>
-                </a:solidFill>
-                <a:miter lim="800000"/>
-                <a:headEnd/>
-                <a:tailEnd/>
-              </a14:hiddenLine>
-            </a:ext>
-          </a:extLst>
-        </p:spPr>
-      </p:pic>
     </p:spTree>
     <p:extLst>
       <p:ext uri="{BB962C8B-B14F-4D97-AF65-F5344CB8AC3E}">
-        <p14:creationId xmlns:p14="http://schemas.microsoft.com/office/powerpoint/2010/main" val="1350431017"/>
+        <p14:creationId xmlns:p14="http://schemas.microsoft.com/office/powerpoint/2010/main" val="944212144"/>
       </p:ext>
     </p:extLst>
   </p:cSld>

</xml_diff>